<commit_message>
update: svg of logo, css, and split controller and js file.
</commit_message>
<xml_diff>
--- a/doc/簡1.pptx
+++ b/doc/簡1.pptx
@@ -8,9 +8,10 @@
     <p:sldId id="256" r:id="rId2"/>
     <p:sldId id="258" r:id="rId3"/>
     <p:sldId id="260" r:id="rId4"/>
-    <p:sldId id="261" r:id="rId5"/>
-    <p:sldId id="259" r:id="rId6"/>
-    <p:sldId id="257" r:id="rId7"/>
+    <p:sldId id="262" r:id="rId5"/>
+    <p:sldId id="261" r:id="rId6"/>
+    <p:sldId id="259" r:id="rId7"/>
+    <p:sldId id="257" r:id="rId8"/>
   </p:sldIdLst>
   <p:sldSz cx="21599525" cy="28802013"/>
   <p:notesSz cx="6858000" cy="9144000"/>
@@ -248,7 +249,7 @@
           <a:p>
             <a:fld id="{96A8DF72-FD96-4913-964C-74D2BCEFC369}" type="datetimeFigureOut">
               <a:rPr lang="zh-TW" altLang="en-US" smtClean="0"/>
-              <a:t>2018/1/11</a:t>
+              <a:t>2018/1/12</a:t>
             </a:fld>
             <a:endParaRPr lang="zh-TW" altLang="en-US"/>
           </a:p>
@@ -418,7 +419,7 @@
           <a:p>
             <a:fld id="{96A8DF72-FD96-4913-964C-74D2BCEFC369}" type="datetimeFigureOut">
               <a:rPr lang="zh-TW" altLang="en-US" smtClean="0"/>
-              <a:t>2018/1/11</a:t>
+              <a:t>2018/1/12</a:t>
             </a:fld>
             <a:endParaRPr lang="zh-TW" altLang="en-US"/>
           </a:p>
@@ -598,7 +599,7 @@
           <a:p>
             <a:fld id="{96A8DF72-FD96-4913-964C-74D2BCEFC369}" type="datetimeFigureOut">
               <a:rPr lang="zh-TW" altLang="en-US" smtClean="0"/>
-              <a:t>2018/1/11</a:t>
+              <a:t>2018/1/12</a:t>
             </a:fld>
             <a:endParaRPr lang="zh-TW" altLang="en-US"/>
           </a:p>
@@ -768,7 +769,7 @@
           <a:p>
             <a:fld id="{96A8DF72-FD96-4913-964C-74D2BCEFC369}" type="datetimeFigureOut">
               <a:rPr lang="zh-TW" altLang="en-US" smtClean="0"/>
-              <a:t>2018/1/11</a:t>
+              <a:t>2018/1/12</a:t>
             </a:fld>
             <a:endParaRPr lang="zh-TW" altLang="en-US"/>
           </a:p>
@@ -1012,7 +1013,7 @@
           <a:p>
             <a:fld id="{96A8DF72-FD96-4913-964C-74D2BCEFC369}" type="datetimeFigureOut">
               <a:rPr lang="zh-TW" altLang="en-US" smtClean="0"/>
-              <a:t>2018/1/11</a:t>
+              <a:t>2018/1/12</a:t>
             </a:fld>
             <a:endParaRPr lang="zh-TW" altLang="en-US"/>
           </a:p>
@@ -1244,7 +1245,7 @@
           <a:p>
             <a:fld id="{96A8DF72-FD96-4913-964C-74D2BCEFC369}" type="datetimeFigureOut">
               <a:rPr lang="zh-TW" altLang="en-US" smtClean="0"/>
-              <a:t>2018/1/11</a:t>
+              <a:t>2018/1/12</a:t>
             </a:fld>
             <a:endParaRPr lang="zh-TW" altLang="en-US"/>
           </a:p>
@@ -1611,7 +1612,7 @@
           <a:p>
             <a:fld id="{96A8DF72-FD96-4913-964C-74D2BCEFC369}" type="datetimeFigureOut">
               <a:rPr lang="zh-TW" altLang="en-US" smtClean="0"/>
-              <a:t>2018/1/11</a:t>
+              <a:t>2018/1/12</a:t>
             </a:fld>
             <a:endParaRPr lang="zh-TW" altLang="en-US"/>
           </a:p>
@@ -1729,7 +1730,7 @@
           <a:p>
             <a:fld id="{96A8DF72-FD96-4913-964C-74D2BCEFC369}" type="datetimeFigureOut">
               <a:rPr lang="zh-TW" altLang="en-US" smtClean="0"/>
-              <a:t>2018/1/11</a:t>
+              <a:t>2018/1/12</a:t>
             </a:fld>
             <a:endParaRPr lang="zh-TW" altLang="en-US"/>
           </a:p>
@@ -1824,7 +1825,7 @@
           <a:p>
             <a:fld id="{96A8DF72-FD96-4913-964C-74D2BCEFC369}" type="datetimeFigureOut">
               <a:rPr lang="zh-TW" altLang="en-US" smtClean="0"/>
-              <a:t>2018/1/11</a:t>
+              <a:t>2018/1/12</a:t>
             </a:fld>
             <a:endParaRPr lang="zh-TW" altLang="en-US"/>
           </a:p>
@@ -2101,7 +2102,7 @@
           <a:p>
             <a:fld id="{96A8DF72-FD96-4913-964C-74D2BCEFC369}" type="datetimeFigureOut">
               <a:rPr lang="zh-TW" altLang="en-US" smtClean="0"/>
-              <a:t>2018/1/11</a:t>
+              <a:t>2018/1/12</a:t>
             </a:fld>
             <a:endParaRPr lang="zh-TW" altLang="en-US"/>
           </a:p>
@@ -2358,7 +2359,7 @@
           <a:p>
             <a:fld id="{96A8DF72-FD96-4913-964C-74D2BCEFC369}" type="datetimeFigureOut">
               <a:rPr lang="zh-TW" altLang="en-US" smtClean="0"/>
-              <a:t>2018/1/11</a:t>
+              <a:t>2018/1/12</a:t>
             </a:fld>
             <a:endParaRPr lang="zh-TW" altLang="en-US"/>
           </a:p>
@@ -2571,7 +2572,7 @@
           <a:p>
             <a:fld id="{96A8DF72-FD96-4913-964C-74D2BCEFC369}" type="datetimeFigureOut">
               <a:rPr lang="zh-TW" altLang="en-US" smtClean="0"/>
-              <a:t>2018/1/11</a:t>
+              <a:t>2018/1/12</a:t>
             </a:fld>
             <a:endParaRPr lang="zh-TW" altLang="en-US"/>
           </a:p>
@@ -6211,6 +6212,2334 @@
         </p:nvGrpSpPr>
         <p:grpSpPr>
           <a:xfrm>
+            <a:off x="7413633" y="937271"/>
+            <a:ext cx="6426586" cy="6442322"/>
+            <a:chOff x="7377840" y="12701009"/>
+            <a:chExt cx="6426586" cy="6442322"/>
+          </a:xfrm>
+        </p:grpSpPr>
+        <p:sp>
+          <p:nvSpPr>
+            <p:cNvPr id="12" name="菱形 11"/>
+            <p:cNvSpPr/>
+            <p:nvPr/>
+          </p:nvSpPr>
+          <p:spPr>
+            <a:xfrm>
+              <a:off x="7734767" y="12701009"/>
+              <a:ext cx="6069659" cy="6442322"/>
+            </a:xfrm>
+            <a:prstGeom prst="diamond">
+              <a:avLst/>
+            </a:prstGeom>
+            <a:solidFill>
+              <a:srgbClr val="C3C33D"/>
+            </a:solidFill>
+            <a:ln>
+              <a:noFill/>
+            </a:ln>
+          </p:spPr>
+          <p:style>
+            <a:lnRef idx="2">
+              <a:schemeClr val="accent1">
+                <a:shade val="50000"/>
+              </a:schemeClr>
+            </a:lnRef>
+            <a:fillRef idx="1">
+              <a:schemeClr val="accent1"/>
+            </a:fillRef>
+            <a:effectRef idx="0">
+              <a:schemeClr val="accent1"/>
+            </a:effectRef>
+            <a:fontRef idx="minor">
+              <a:schemeClr val="lt1"/>
+            </a:fontRef>
+          </p:style>
+          <p:txBody>
+            <a:bodyPr rtlCol="0" anchor="ctr"/>
+            <a:lstStyle/>
+            <a:p>
+              <a:pPr algn="ctr"/>
+              <a:endParaRPr lang="zh-TW" altLang="en-US"/>
+            </a:p>
+          </p:txBody>
+        </p:sp>
+        <p:sp>
+          <p:nvSpPr>
+            <p:cNvPr id="13" name="文字方塊 12"/>
+            <p:cNvSpPr txBox="1"/>
+            <p:nvPr/>
+          </p:nvSpPr>
+          <p:spPr>
+            <a:xfrm rot="16200000">
+              <a:off x="8144404" y="13852980"/>
+              <a:ext cx="3483630" cy="5016758"/>
+            </a:xfrm>
+            <a:prstGeom prst="rect">
+              <a:avLst/>
+            </a:prstGeom>
+            <a:noFill/>
+          </p:spPr>
+          <p:txBody>
+            <a:bodyPr wrap="square" rtlCol="0">
+              <a:spAutoFit/>
+            </a:bodyPr>
+            <a:lstStyle/>
+            <a:p>
+              <a:r>
+                <a:rPr lang="zh-TW" altLang="en-US" sz="8000" b="1" dirty="0">
+                  <a:solidFill>
+                    <a:srgbClr val="342B39"/>
+                  </a:solidFill>
+                </a:rPr>
+                <a:t>目目</a:t>
+              </a:r>
+              <a:r>
+                <a:rPr lang="zh-TW" altLang="en-US" sz="8000" b="1" dirty="0" smtClean="0">
+                  <a:solidFill>
+                    <a:srgbClr val="342B39"/>
+                  </a:solidFill>
+                </a:rPr>
+                <a:t>目目</a:t>
+              </a:r>
+              <a:r>
+                <a:rPr lang="zh-TW" altLang="en-US" sz="8000" b="1" dirty="0">
+                  <a:solidFill>
+                    <a:srgbClr val="342B39"/>
+                  </a:solidFill>
+                </a:rPr>
+                <a:t>目目</a:t>
+              </a:r>
+            </a:p>
+            <a:p>
+              <a:endParaRPr lang="zh-TW" altLang="en-US" sz="8000" b="1" dirty="0">
+                <a:solidFill>
+                  <a:srgbClr val="342B39"/>
+                </a:solidFill>
+              </a:endParaRPr>
+            </a:p>
+            <a:p>
+              <a:endParaRPr lang="zh-TW" altLang="en-US" sz="8000" b="1" dirty="0">
+                <a:solidFill>
+                  <a:srgbClr val="342B39"/>
+                </a:solidFill>
+              </a:endParaRPr>
+            </a:p>
+          </p:txBody>
+        </p:sp>
+        <p:sp>
+          <p:nvSpPr>
+            <p:cNvPr id="14" name="矩形 13"/>
+            <p:cNvSpPr/>
+            <p:nvPr/>
+          </p:nvSpPr>
+          <p:spPr>
+            <a:xfrm rot="5400000">
+              <a:off x="9168640" y="15915070"/>
+              <a:ext cx="1636987" cy="577081"/>
+            </a:xfrm>
+            <a:prstGeom prst="rect">
+              <a:avLst/>
+            </a:prstGeom>
+          </p:spPr>
+          <p:txBody>
+            <a:bodyPr vert="horz" wrap="none">
+              <a:spAutoFit/>
+            </a:bodyPr>
+            <a:lstStyle/>
+            <a:p>
+              <a:r>
+                <a:rPr lang="en-US" altLang="zh-TW" dirty="0" smtClean="0">
+                  <a:solidFill>
+                    <a:srgbClr val="342B39"/>
+                  </a:solidFill>
+                  <a:latin typeface="Courier New" panose="02070309020205020404" pitchFamily="49" charset="0"/>
+                  <a:cs typeface="Courier New" panose="02070309020205020404" pitchFamily="49" charset="0"/>
+                </a:rPr>
+                <a:t>KlareH</a:t>
+              </a:r>
+              <a:endParaRPr lang="zh-TW" altLang="en-US" dirty="0">
+                <a:solidFill>
+                  <a:srgbClr val="342B39"/>
+                </a:solidFill>
+                <a:latin typeface="Courier New" panose="02070309020205020404" pitchFamily="49" charset="0"/>
+                <a:cs typeface="Courier New" panose="02070309020205020404" pitchFamily="49" charset="0"/>
+              </a:endParaRPr>
+            </a:p>
+          </p:txBody>
+        </p:sp>
+        <p:sp>
+          <p:nvSpPr>
+            <p:cNvPr id="66" name="文字方塊 65"/>
+            <p:cNvSpPr txBox="1"/>
+            <p:nvPr/>
+          </p:nvSpPr>
+          <p:spPr>
+            <a:xfrm rot="16200000">
+              <a:off x="10269952" y="14671024"/>
+              <a:ext cx="3820247" cy="2215991"/>
+            </a:xfrm>
+            <a:prstGeom prst="rect">
+              <a:avLst/>
+            </a:prstGeom>
+            <a:noFill/>
+          </p:spPr>
+          <p:txBody>
+            <a:bodyPr wrap="square" rtlCol="0">
+              <a:spAutoFit/>
+            </a:bodyPr>
+            <a:lstStyle/>
+            <a:p>
+              <a:r>
+                <a:rPr lang="zh-TW" altLang="en-US" sz="13800" b="1" dirty="0" smtClean="0">
+                  <a:solidFill>
+                    <a:srgbClr val="342B39"/>
+                  </a:solidFill>
+                </a:rPr>
+                <a:t>目</a:t>
+              </a:r>
+              <a:r>
+                <a:rPr lang="zh-TW" altLang="en-US" sz="13800" b="1" dirty="0" smtClean="0">
+                  <a:solidFill>
+                    <a:srgbClr val="342B39"/>
+                  </a:solidFill>
+                </a:rPr>
+                <a:t>日</a:t>
+              </a:r>
+              <a:endParaRPr lang="zh-TW" altLang="en-US" sz="13800" b="1" dirty="0">
+                <a:solidFill>
+                  <a:srgbClr val="342B39"/>
+                </a:solidFill>
+              </a:endParaRPr>
+            </a:p>
+          </p:txBody>
+        </p:sp>
+      </p:grpSp>
+      <p:grpSp>
+        <p:nvGrpSpPr>
+          <p:cNvPr id="26" name="群組 25"/>
+          <p:cNvGrpSpPr/>
+          <p:nvPr/>
+        </p:nvGrpSpPr>
+        <p:grpSpPr>
+          <a:xfrm>
+            <a:off x="5260517" y="27092994"/>
+            <a:ext cx="3347046" cy="3978938"/>
+            <a:chOff x="11186245" y="22207464"/>
+            <a:chExt cx="6069662" cy="7215560"/>
+          </a:xfrm>
+        </p:grpSpPr>
+        <p:sp>
+          <p:nvSpPr>
+            <p:cNvPr id="27" name="菱形 26"/>
+            <p:cNvSpPr/>
+            <p:nvPr/>
+          </p:nvSpPr>
+          <p:spPr>
+            <a:xfrm>
+              <a:off x="11186248" y="22207464"/>
+              <a:ext cx="6069659" cy="6442322"/>
+            </a:xfrm>
+            <a:prstGeom prst="diamond">
+              <a:avLst/>
+            </a:prstGeom>
+            <a:noFill/>
+            <a:ln w="38100">
+              <a:solidFill>
+                <a:srgbClr val="7EE2B2"/>
+              </a:solidFill>
+            </a:ln>
+          </p:spPr>
+          <p:style>
+            <a:lnRef idx="2">
+              <a:schemeClr val="accent1">
+                <a:shade val="50000"/>
+              </a:schemeClr>
+            </a:lnRef>
+            <a:fillRef idx="1">
+              <a:schemeClr val="accent1"/>
+            </a:fillRef>
+            <a:effectRef idx="0">
+              <a:schemeClr val="accent1"/>
+            </a:effectRef>
+            <a:fontRef idx="minor">
+              <a:schemeClr val="lt1"/>
+            </a:fontRef>
+          </p:style>
+          <p:txBody>
+            <a:bodyPr rtlCol="0" anchor="ctr"/>
+            <a:lstStyle/>
+            <a:p>
+              <a:pPr algn="ctr"/>
+              <a:endParaRPr lang="zh-TW" altLang="en-US"/>
+            </a:p>
+          </p:txBody>
+        </p:sp>
+        <p:sp>
+          <p:nvSpPr>
+            <p:cNvPr id="28" name="菱形 27"/>
+            <p:cNvSpPr/>
+            <p:nvPr/>
+          </p:nvSpPr>
+          <p:spPr>
+            <a:xfrm>
+              <a:off x="11186247" y="22465210"/>
+              <a:ext cx="6069659" cy="6442322"/>
+            </a:xfrm>
+            <a:prstGeom prst="diamond">
+              <a:avLst/>
+            </a:prstGeom>
+            <a:noFill/>
+            <a:ln w="38100">
+              <a:solidFill>
+                <a:srgbClr val="7EE2B2"/>
+              </a:solidFill>
+            </a:ln>
+          </p:spPr>
+          <p:style>
+            <a:lnRef idx="2">
+              <a:schemeClr val="accent1">
+                <a:shade val="50000"/>
+              </a:schemeClr>
+            </a:lnRef>
+            <a:fillRef idx="1">
+              <a:schemeClr val="accent1"/>
+            </a:fillRef>
+            <a:effectRef idx="0">
+              <a:schemeClr val="accent1"/>
+            </a:effectRef>
+            <a:fontRef idx="minor">
+              <a:schemeClr val="lt1"/>
+            </a:fontRef>
+          </p:style>
+          <p:txBody>
+            <a:bodyPr rtlCol="0" anchor="ctr"/>
+            <a:lstStyle/>
+            <a:p>
+              <a:pPr algn="ctr"/>
+              <a:endParaRPr lang="zh-TW" altLang="en-US"/>
+            </a:p>
+          </p:txBody>
+        </p:sp>
+        <p:sp>
+          <p:nvSpPr>
+            <p:cNvPr id="29" name="菱形 28"/>
+            <p:cNvSpPr/>
+            <p:nvPr/>
+          </p:nvSpPr>
+          <p:spPr>
+            <a:xfrm>
+              <a:off x="11186246" y="22722956"/>
+              <a:ext cx="6069659" cy="6442322"/>
+            </a:xfrm>
+            <a:prstGeom prst="diamond">
+              <a:avLst/>
+            </a:prstGeom>
+            <a:noFill/>
+            <a:ln w="38100">
+              <a:solidFill>
+                <a:srgbClr val="7EE2B2"/>
+              </a:solidFill>
+            </a:ln>
+          </p:spPr>
+          <p:style>
+            <a:lnRef idx="2">
+              <a:schemeClr val="accent1">
+                <a:shade val="50000"/>
+              </a:schemeClr>
+            </a:lnRef>
+            <a:fillRef idx="1">
+              <a:schemeClr val="accent1"/>
+            </a:fillRef>
+            <a:effectRef idx="0">
+              <a:schemeClr val="accent1"/>
+            </a:effectRef>
+            <a:fontRef idx="minor">
+              <a:schemeClr val="lt1"/>
+            </a:fontRef>
+          </p:style>
+          <p:txBody>
+            <a:bodyPr rtlCol="0" anchor="ctr"/>
+            <a:lstStyle/>
+            <a:p>
+              <a:pPr algn="ctr"/>
+              <a:endParaRPr lang="zh-TW" altLang="en-US"/>
+            </a:p>
+          </p:txBody>
+        </p:sp>
+        <p:sp>
+          <p:nvSpPr>
+            <p:cNvPr id="30" name="菱形 29"/>
+            <p:cNvSpPr/>
+            <p:nvPr/>
+          </p:nvSpPr>
+          <p:spPr>
+            <a:xfrm>
+              <a:off x="11186245" y="22980702"/>
+              <a:ext cx="6069659" cy="6442322"/>
+            </a:xfrm>
+            <a:prstGeom prst="diamond">
+              <a:avLst/>
+            </a:prstGeom>
+            <a:noFill/>
+            <a:ln w="38100">
+              <a:solidFill>
+                <a:srgbClr val="7EE2B2"/>
+              </a:solidFill>
+            </a:ln>
+          </p:spPr>
+          <p:style>
+            <a:lnRef idx="2">
+              <a:schemeClr val="accent1">
+                <a:shade val="50000"/>
+              </a:schemeClr>
+            </a:lnRef>
+            <a:fillRef idx="1">
+              <a:schemeClr val="accent1"/>
+            </a:fillRef>
+            <a:effectRef idx="0">
+              <a:schemeClr val="accent1"/>
+            </a:effectRef>
+            <a:fontRef idx="minor">
+              <a:schemeClr val="lt1"/>
+            </a:fontRef>
+          </p:style>
+          <p:txBody>
+            <a:bodyPr rtlCol="0" anchor="ctr"/>
+            <a:lstStyle/>
+            <a:p>
+              <a:pPr algn="ctr"/>
+              <a:endParaRPr lang="zh-TW" altLang="en-US"/>
+            </a:p>
+          </p:txBody>
+        </p:sp>
+      </p:grpSp>
+      <p:grpSp>
+        <p:nvGrpSpPr>
+          <p:cNvPr id="31" name="群組 30"/>
+          <p:cNvGrpSpPr/>
+          <p:nvPr/>
+        </p:nvGrpSpPr>
+        <p:grpSpPr>
+          <a:xfrm>
+            <a:off x="6479717" y="27092994"/>
+            <a:ext cx="3347046" cy="3978938"/>
+            <a:chOff x="11186245" y="22207464"/>
+            <a:chExt cx="6069662" cy="7215560"/>
+          </a:xfrm>
+        </p:grpSpPr>
+        <p:sp>
+          <p:nvSpPr>
+            <p:cNvPr id="32" name="菱形 31"/>
+            <p:cNvSpPr/>
+            <p:nvPr/>
+          </p:nvSpPr>
+          <p:spPr>
+            <a:xfrm>
+              <a:off x="11186248" y="22207464"/>
+              <a:ext cx="6069659" cy="6442322"/>
+            </a:xfrm>
+            <a:prstGeom prst="diamond">
+              <a:avLst/>
+            </a:prstGeom>
+            <a:noFill/>
+            <a:ln w="38100">
+              <a:solidFill>
+                <a:srgbClr val="7EE2B2"/>
+              </a:solidFill>
+            </a:ln>
+          </p:spPr>
+          <p:style>
+            <a:lnRef idx="2">
+              <a:schemeClr val="accent1">
+                <a:shade val="50000"/>
+              </a:schemeClr>
+            </a:lnRef>
+            <a:fillRef idx="1">
+              <a:schemeClr val="accent1"/>
+            </a:fillRef>
+            <a:effectRef idx="0">
+              <a:schemeClr val="accent1"/>
+            </a:effectRef>
+            <a:fontRef idx="minor">
+              <a:schemeClr val="lt1"/>
+            </a:fontRef>
+          </p:style>
+          <p:txBody>
+            <a:bodyPr rtlCol="0" anchor="ctr"/>
+            <a:lstStyle/>
+            <a:p>
+              <a:pPr algn="ctr"/>
+              <a:endParaRPr lang="zh-TW" altLang="en-US"/>
+            </a:p>
+          </p:txBody>
+        </p:sp>
+        <p:sp>
+          <p:nvSpPr>
+            <p:cNvPr id="33" name="菱形 32"/>
+            <p:cNvSpPr/>
+            <p:nvPr/>
+          </p:nvSpPr>
+          <p:spPr>
+            <a:xfrm>
+              <a:off x="11186247" y="22465210"/>
+              <a:ext cx="6069659" cy="6442322"/>
+            </a:xfrm>
+            <a:prstGeom prst="diamond">
+              <a:avLst/>
+            </a:prstGeom>
+            <a:noFill/>
+            <a:ln w="38100">
+              <a:solidFill>
+                <a:srgbClr val="7EE2B2"/>
+              </a:solidFill>
+            </a:ln>
+          </p:spPr>
+          <p:style>
+            <a:lnRef idx="2">
+              <a:schemeClr val="accent1">
+                <a:shade val="50000"/>
+              </a:schemeClr>
+            </a:lnRef>
+            <a:fillRef idx="1">
+              <a:schemeClr val="accent1"/>
+            </a:fillRef>
+            <a:effectRef idx="0">
+              <a:schemeClr val="accent1"/>
+            </a:effectRef>
+            <a:fontRef idx="minor">
+              <a:schemeClr val="lt1"/>
+            </a:fontRef>
+          </p:style>
+          <p:txBody>
+            <a:bodyPr rtlCol="0" anchor="ctr"/>
+            <a:lstStyle/>
+            <a:p>
+              <a:pPr algn="ctr"/>
+              <a:endParaRPr lang="zh-TW" altLang="en-US"/>
+            </a:p>
+          </p:txBody>
+        </p:sp>
+        <p:sp>
+          <p:nvSpPr>
+            <p:cNvPr id="34" name="菱形 33"/>
+            <p:cNvSpPr/>
+            <p:nvPr/>
+          </p:nvSpPr>
+          <p:spPr>
+            <a:xfrm>
+              <a:off x="11186246" y="22722956"/>
+              <a:ext cx="6069659" cy="6442322"/>
+            </a:xfrm>
+            <a:prstGeom prst="diamond">
+              <a:avLst/>
+            </a:prstGeom>
+            <a:noFill/>
+            <a:ln w="38100">
+              <a:solidFill>
+                <a:srgbClr val="7EE2B2"/>
+              </a:solidFill>
+            </a:ln>
+          </p:spPr>
+          <p:style>
+            <a:lnRef idx="2">
+              <a:schemeClr val="accent1">
+                <a:shade val="50000"/>
+              </a:schemeClr>
+            </a:lnRef>
+            <a:fillRef idx="1">
+              <a:schemeClr val="accent1"/>
+            </a:fillRef>
+            <a:effectRef idx="0">
+              <a:schemeClr val="accent1"/>
+            </a:effectRef>
+            <a:fontRef idx="minor">
+              <a:schemeClr val="lt1"/>
+            </a:fontRef>
+          </p:style>
+          <p:txBody>
+            <a:bodyPr rtlCol="0" anchor="ctr"/>
+            <a:lstStyle/>
+            <a:p>
+              <a:pPr algn="ctr"/>
+              <a:endParaRPr lang="zh-TW" altLang="en-US"/>
+            </a:p>
+          </p:txBody>
+        </p:sp>
+        <p:sp>
+          <p:nvSpPr>
+            <p:cNvPr id="35" name="菱形 34"/>
+            <p:cNvSpPr/>
+            <p:nvPr/>
+          </p:nvSpPr>
+          <p:spPr>
+            <a:xfrm>
+              <a:off x="11186245" y="22980702"/>
+              <a:ext cx="6069659" cy="6442322"/>
+            </a:xfrm>
+            <a:prstGeom prst="diamond">
+              <a:avLst/>
+            </a:prstGeom>
+            <a:noFill/>
+            <a:ln w="38100">
+              <a:solidFill>
+                <a:srgbClr val="7EE2B2"/>
+              </a:solidFill>
+            </a:ln>
+          </p:spPr>
+          <p:style>
+            <a:lnRef idx="2">
+              <a:schemeClr val="accent1">
+                <a:shade val="50000"/>
+              </a:schemeClr>
+            </a:lnRef>
+            <a:fillRef idx="1">
+              <a:schemeClr val="accent1"/>
+            </a:fillRef>
+            <a:effectRef idx="0">
+              <a:schemeClr val="accent1"/>
+            </a:effectRef>
+            <a:fontRef idx="minor">
+              <a:schemeClr val="lt1"/>
+            </a:fontRef>
+          </p:style>
+          <p:txBody>
+            <a:bodyPr rtlCol="0" anchor="ctr"/>
+            <a:lstStyle/>
+            <a:p>
+              <a:pPr algn="ctr"/>
+              <a:endParaRPr lang="zh-TW" altLang="en-US"/>
+            </a:p>
+          </p:txBody>
+        </p:sp>
+      </p:grpSp>
+      <p:grpSp>
+        <p:nvGrpSpPr>
+          <p:cNvPr id="36" name="群組 35"/>
+          <p:cNvGrpSpPr/>
+          <p:nvPr/>
+        </p:nvGrpSpPr>
+        <p:grpSpPr>
+          <a:xfrm>
+            <a:off x="11650342" y="27092994"/>
+            <a:ext cx="3347046" cy="3978938"/>
+            <a:chOff x="11186245" y="22207464"/>
+            <a:chExt cx="6069662" cy="7215560"/>
+          </a:xfrm>
+        </p:grpSpPr>
+        <p:sp>
+          <p:nvSpPr>
+            <p:cNvPr id="37" name="菱形 36"/>
+            <p:cNvSpPr/>
+            <p:nvPr/>
+          </p:nvSpPr>
+          <p:spPr>
+            <a:xfrm>
+              <a:off x="11186248" y="22207464"/>
+              <a:ext cx="6069659" cy="6442322"/>
+            </a:xfrm>
+            <a:prstGeom prst="diamond">
+              <a:avLst/>
+            </a:prstGeom>
+            <a:noFill/>
+            <a:ln w="38100">
+              <a:solidFill>
+                <a:srgbClr val="7EE2B2"/>
+              </a:solidFill>
+            </a:ln>
+          </p:spPr>
+          <p:style>
+            <a:lnRef idx="2">
+              <a:schemeClr val="accent1">
+                <a:shade val="50000"/>
+              </a:schemeClr>
+            </a:lnRef>
+            <a:fillRef idx="1">
+              <a:schemeClr val="accent1"/>
+            </a:fillRef>
+            <a:effectRef idx="0">
+              <a:schemeClr val="accent1"/>
+            </a:effectRef>
+            <a:fontRef idx="minor">
+              <a:schemeClr val="lt1"/>
+            </a:fontRef>
+          </p:style>
+          <p:txBody>
+            <a:bodyPr rtlCol="0" anchor="ctr"/>
+            <a:lstStyle/>
+            <a:p>
+              <a:pPr algn="ctr"/>
+              <a:endParaRPr lang="zh-TW" altLang="en-US"/>
+            </a:p>
+          </p:txBody>
+        </p:sp>
+        <p:sp>
+          <p:nvSpPr>
+            <p:cNvPr id="38" name="菱形 37"/>
+            <p:cNvSpPr/>
+            <p:nvPr/>
+          </p:nvSpPr>
+          <p:spPr>
+            <a:xfrm>
+              <a:off x="11186247" y="22465210"/>
+              <a:ext cx="6069659" cy="6442322"/>
+            </a:xfrm>
+            <a:prstGeom prst="diamond">
+              <a:avLst/>
+            </a:prstGeom>
+            <a:noFill/>
+            <a:ln w="38100">
+              <a:solidFill>
+                <a:srgbClr val="7EE2B2"/>
+              </a:solidFill>
+            </a:ln>
+          </p:spPr>
+          <p:style>
+            <a:lnRef idx="2">
+              <a:schemeClr val="accent1">
+                <a:shade val="50000"/>
+              </a:schemeClr>
+            </a:lnRef>
+            <a:fillRef idx="1">
+              <a:schemeClr val="accent1"/>
+            </a:fillRef>
+            <a:effectRef idx="0">
+              <a:schemeClr val="accent1"/>
+            </a:effectRef>
+            <a:fontRef idx="minor">
+              <a:schemeClr val="lt1"/>
+            </a:fontRef>
+          </p:style>
+          <p:txBody>
+            <a:bodyPr rtlCol="0" anchor="ctr"/>
+            <a:lstStyle/>
+            <a:p>
+              <a:pPr algn="ctr"/>
+              <a:endParaRPr lang="zh-TW" altLang="en-US"/>
+            </a:p>
+          </p:txBody>
+        </p:sp>
+        <p:sp>
+          <p:nvSpPr>
+            <p:cNvPr id="39" name="菱形 38"/>
+            <p:cNvSpPr/>
+            <p:nvPr/>
+          </p:nvSpPr>
+          <p:spPr>
+            <a:xfrm>
+              <a:off x="11186246" y="22722956"/>
+              <a:ext cx="6069659" cy="6442322"/>
+            </a:xfrm>
+            <a:prstGeom prst="diamond">
+              <a:avLst/>
+            </a:prstGeom>
+            <a:noFill/>
+            <a:ln w="38100">
+              <a:solidFill>
+                <a:srgbClr val="7EE2B2"/>
+              </a:solidFill>
+            </a:ln>
+          </p:spPr>
+          <p:style>
+            <a:lnRef idx="2">
+              <a:schemeClr val="accent1">
+                <a:shade val="50000"/>
+              </a:schemeClr>
+            </a:lnRef>
+            <a:fillRef idx="1">
+              <a:schemeClr val="accent1"/>
+            </a:fillRef>
+            <a:effectRef idx="0">
+              <a:schemeClr val="accent1"/>
+            </a:effectRef>
+            <a:fontRef idx="minor">
+              <a:schemeClr val="lt1"/>
+            </a:fontRef>
+          </p:style>
+          <p:txBody>
+            <a:bodyPr rtlCol="0" anchor="ctr"/>
+            <a:lstStyle/>
+            <a:p>
+              <a:pPr algn="ctr"/>
+              <a:endParaRPr lang="zh-TW" altLang="en-US"/>
+            </a:p>
+          </p:txBody>
+        </p:sp>
+        <p:sp>
+          <p:nvSpPr>
+            <p:cNvPr id="40" name="菱形 39"/>
+            <p:cNvSpPr/>
+            <p:nvPr/>
+          </p:nvSpPr>
+          <p:spPr>
+            <a:xfrm>
+              <a:off x="11186245" y="22980702"/>
+              <a:ext cx="6069659" cy="6442322"/>
+            </a:xfrm>
+            <a:prstGeom prst="diamond">
+              <a:avLst/>
+            </a:prstGeom>
+            <a:noFill/>
+            <a:ln w="38100">
+              <a:solidFill>
+                <a:srgbClr val="7EE2B2"/>
+              </a:solidFill>
+            </a:ln>
+          </p:spPr>
+          <p:style>
+            <a:lnRef idx="2">
+              <a:schemeClr val="accent1">
+                <a:shade val="50000"/>
+              </a:schemeClr>
+            </a:lnRef>
+            <a:fillRef idx="1">
+              <a:schemeClr val="accent1"/>
+            </a:fillRef>
+            <a:effectRef idx="0">
+              <a:schemeClr val="accent1"/>
+            </a:effectRef>
+            <a:fontRef idx="minor">
+              <a:schemeClr val="lt1"/>
+            </a:fontRef>
+          </p:style>
+          <p:txBody>
+            <a:bodyPr rtlCol="0" anchor="ctr"/>
+            <a:lstStyle/>
+            <a:p>
+              <a:pPr algn="ctr"/>
+              <a:endParaRPr lang="zh-TW" altLang="en-US"/>
+            </a:p>
+          </p:txBody>
+        </p:sp>
+      </p:grpSp>
+      <p:grpSp>
+        <p:nvGrpSpPr>
+          <p:cNvPr id="41" name="群組 40"/>
+          <p:cNvGrpSpPr/>
+          <p:nvPr/>
+        </p:nvGrpSpPr>
+        <p:grpSpPr>
+          <a:xfrm>
+            <a:off x="12850673" y="27214488"/>
+            <a:ext cx="3347046" cy="3978938"/>
+            <a:chOff x="11186245" y="22207464"/>
+            <a:chExt cx="6069662" cy="7215560"/>
+          </a:xfrm>
+        </p:grpSpPr>
+        <p:sp>
+          <p:nvSpPr>
+            <p:cNvPr id="42" name="菱形 41"/>
+            <p:cNvSpPr/>
+            <p:nvPr/>
+          </p:nvSpPr>
+          <p:spPr>
+            <a:xfrm>
+              <a:off x="11186248" y="22207464"/>
+              <a:ext cx="6069659" cy="6442322"/>
+            </a:xfrm>
+            <a:prstGeom prst="diamond">
+              <a:avLst/>
+            </a:prstGeom>
+            <a:noFill/>
+            <a:ln w="38100">
+              <a:solidFill>
+                <a:srgbClr val="7EE2B2"/>
+              </a:solidFill>
+            </a:ln>
+          </p:spPr>
+          <p:style>
+            <a:lnRef idx="2">
+              <a:schemeClr val="accent1">
+                <a:shade val="50000"/>
+              </a:schemeClr>
+            </a:lnRef>
+            <a:fillRef idx="1">
+              <a:schemeClr val="accent1"/>
+            </a:fillRef>
+            <a:effectRef idx="0">
+              <a:schemeClr val="accent1"/>
+            </a:effectRef>
+            <a:fontRef idx="minor">
+              <a:schemeClr val="lt1"/>
+            </a:fontRef>
+          </p:style>
+          <p:txBody>
+            <a:bodyPr rtlCol="0" anchor="ctr"/>
+            <a:lstStyle/>
+            <a:p>
+              <a:pPr algn="ctr"/>
+              <a:endParaRPr lang="zh-TW" altLang="en-US"/>
+            </a:p>
+          </p:txBody>
+        </p:sp>
+        <p:sp>
+          <p:nvSpPr>
+            <p:cNvPr id="43" name="菱形 42"/>
+            <p:cNvSpPr/>
+            <p:nvPr/>
+          </p:nvSpPr>
+          <p:spPr>
+            <a:xfrm>
+              <a:off x="11186247" y="22465210"/>
+              <a:ext cx="6069659" cy="6442322"/>
+            </a:xfrm>
+            <a:prstGeom prst="diamond">
+              <a:avLst/>
+            </a:prstGeom>
+            <a:noFill/>
+            <a:ln w="38100">
+              <a:solidFill>
+                <a:srgbClr val="7EE2B2"/>
+              </a:solidFill>
+            </a:ln>
+          </p:spPr>
+          <p:style>
+            <a:lnRef idx="2">
+              <a:schemeClr val="accent1">
+                <a:shade val="50000"/>
+              </a:schemeClr>
+            </a:lnRef>
+            <a:fillRef idx="1">
+              <a:schemeClr val="accent1"/>
+            </a:fillRef>
+            <a:effectRef idx="0">
+              <a:schemeClr val="accent1"/>
+            </a:effectRef>
+            <a:fontRef idx="minor">
+              <a:schemeClr val="lt1"/>
+            </a:fontRef>
+          </p:style>
+          <p:txBody>
+            <a:bodyPr rtlCol="0" anchor="ctr"/>
+            <a:lstStyle/>
+            <a:p>
+              <a:pPr algn="ctr"/>
+              <a:endParaRPr lang="zh-TW" altLang="en-US"/>
+            </a:p>
+          </p:txBody>
+        </p:sp>
+        <p:sp>
+          <p:nvSpPr>
+            <p:cNvPr id="44" name="菱形 43"/>
+            <p:cNvSpPr/>
+            <p:nvPr/>
+          </p:nvSpPr>
+          <p:spPr>
+            <a:xfrm>
+              <a:off x="11186246" y="22722956"/>
+              <a:ext cx="6069659" cy="6442322"/>
+            </a:xfrm>
+            <a:prstGeom prst="diamond">
+              <a:avLst/>
+            </a:prstGeom>
+            <a:noFill/>
+            <a:ln w="38100">
+              <a:solidFill>
+                <a:srgbClr val="7EE2B2"/>
+              </a:solidFill>
+            </a:ln>
+          </p:spPr>
+          <p:style>
+            <a:lnRef idx="2">
+              <a:schemeClr val="accent1">
+                <a:shade val="50000"/>
+              </a:schemeClr>
+            </a:lnRef>
+            <a:fillRef idx="1">
+              <a:schemeClr val="accent1"/>
+            </a:fillRef>
+            <a:effectRef idx="0">
+              <a:schemeClr val="accent1"/>
+            </a:effectRef>
+            <a:fontRef idx="minor">
+              <a:schemeClr val="lt1"/>
+            </a:fontRef>
+          </p:style>
+          <p:txBody>
+            <a:bodyPr rtlCol="0" anchor="ctr"/>
+            <a:lstStyle/>
+            <a:p>
+              <a:pPr algn="ctr"/>
+              <a:endParaRPr lang="zh-TW" altLang="en-US"/>
+            </a:p>
+          </p:txBody>
+        </p:sp>
+        <p:sp>
+          <p:nvSpPr>
+            <p:cNvPr id="45" name="菱形 44"/>
+            <p:cNvSpPr/>
+            <p:nvPr/>
+          </p:nvSpPr>
+          <p:spPr>
+            <a:xfrm>
+              <a:off x="11186245" y="22980702"/>
+              <a:ext cx="6069659" cy="6442322"/>
+            </a:xfrm>
+            <a:prstGeom prst="diamond">
+              <a:avLst/>
+            </a:prstGeom>
+            <a:noFill/>
+            <a:ln w="38100">
+              <a:solidFill>
+                <a:srgbClr val="7EE2B2"/>
+              </a:solidFill>
+            </a:ln>
+          </p:spPr>
+          <p:style>
+            <a:lnRef idx="2">
+              <a:schemeClr val="accent1">
+                <a:shade val="50000"/>
+              </a:schemeClr>
+            </a:lnRef>
+            <a:fillRef idx="1">
+              <a:schemeClr val="accent1"/>
+            </a:fillRef>
+            <a:effectRef idx="0">
+              <a:schemeClr val="accent1"/>
+            </a:effectRef>
+            <a:fontRef idx="minor">
+              <a:schemeClr val="lt1"/>
+            </a:fontRef>
+          </p:style>
+          <p:txBody>
+            <a:bodyPr rtlCol="0" anchor="ctr"/>
+            <a:lstStyle/>
+            <a:p>
+              <a:pPr algn="ctr"/>
+              <a:endParaRPr lang="zh-TW" altLang="en-US"/>
+            </a:p>
+          </p:txBody>
+        </p:sp>
+      </p:grpSp>
+      <p:grpSp>
+        <p:nvGrpSpPr>
+          <p:cNvPr id="46" name="群組 45"/>
+          <p:cNvGrpSpPr/>
+          <p:nvPr/>
+        </p:nvGrpSpPr>
+        <p:grpSpPr>
+          <a:xfrm>
+            <a:off x="8432809" y="27092994"/>
+            <a:ext cx="3347046" cy="3978938"/>
+            <a:chOff x="11186245" y="22207464"/>
+            <a:chExt cx="6069662" cy="7215560"/>
+          </a:xfrm>
+        </p:grpSpPr>
+        <p:sp>
+          <p:nvSpPr>
+            <p:cNvPr id="47" name="菱形 46"/>
+            <p:cNvSpPr/>
+            <p:nvPr/>
+          </p:nvSpPr>
+          <p:spPr>
+            <a:xfrm>
+              <a:off x="11186248" y="22207464"/>
+              <a:ext cx="6069659" cy="6442322"/>
+            </a:xfrm>
+            <a:prstGeom prst="diamond">
+              <a:avLst/>
+            </a:prstGeom>
+            <a:noFill/>
+            <a:ln w="38100">
+              <a:solidFill>
+                <a:srgbClr val="7EE2B2"/>
+              </a:solidFill>
+            </a:ln>
+          </p:spPr>
+          <p:style>
+            <a:lnRef idx="2">
+              <a:schemeClr val="accent1">
+                <a:shade val="50000"/>
+              </a:schemeClr>
+            </a:lnRef>
+            <a:fillRef idx="1">
+              <a:schemeClr val="accent1"/>
+            </a:fillRef>
+            <a:effectRef idx="0">
+              <a:schemeClr val="accent1"/>
+            </a:effectRef>
+            <a:fontRef idx="minor">
+              <a:schemeClr val="lt1"/>
+            </a:fontRef>
+          </p:style>
+          <p:txBody>
+            <a:bodyPr rtlCol="0" anchor="ctr"/>
+            <a:lstStyle/>
+            <a:p>
+              <a:pPr algn="ctr"/>
+              <a:endParaRPr lang="zh-TW" altLang="en-US"/>
+            </a:p>
+          </p:txBody>
+        </p:sp>
+        <p:sp>
+          <p:nvSpPr>
+            <p:cNvPr id="48" name="菱形 47"/>
+            <p:cNvSpPr/>
+            <p:nvPr/>
+          </p:nvSpPr>
+          <p:spPr>
+            <a:xfrm>
+              <a:off x="11186247" y="22465210"/>
+              <a:ext cx="6069659" cy="6442322"/>
+            </a:xfrm>
+            <a:prstGeom prst="diamond">
+              <a:avLst/>
+            </a:prstGeom>
+            <a:noFill/>
+            <a:ln w="38100">
+              <a:solidFill>
+                <a:srgbClr val="7EE2B2"/>
+              </a:solidFill>
+            </a:ln>
+          </p:spPr>
+          <p:style>
+            <a:lnRef idx="2">
+              <a:schemeClr val="accent1">
+                <a:shade val="50000"/>
+              </a:schemeClr>
+            </a:lnRef>
+            <a:fillRef idx="1">
+              <a:schemeClr val="accent1"/>
+            </a:fillRef>
+            <a:effectRef idx="0">
+              <a:schemeClr val="accent1"/>
+            </a:effectRef>
+            <a:fontRef idx="minor">
+              <a:schemeClr val="lt1"/>
+            </a:fontRef>
+          </p:style>
+          <p:txBody>
+            <a:bodyPr rtlCol="0" anchor="ctr"/>
+            <a:lstStyle/>
+            <a:p>
+              <a:pPr algn="ctr"/>
+              <a:endParaRPr lang="zh-TW" altLang="en-US"/>
+            </a:p>
+          </p:txBody>
+        </p:sp>
+        <p:sp>
+          <p:nvSpPr>
+            <p:cNvPr id="49" name="菱形 48"/>
+            <p:cNvSpPr/>
+            <p:nvPr/>
+          </p:nvSpPr>
+          <p:spPr>
+            <a:xfrm>
+              <a:off x="11186246" y="22722956"/>
+              <a:ext cx="6069659" cy="6442322"/>
+            </a:xfrm>
+            <a:prstGeom prst="diamond">
+              <a:avLst/>
+            </a:prstGeom>
+            <a:noFill/>
+            <a:ln w="38100">
+              <a:solidFill>
+                <a:srgbClr val="7EE2B2"/>
+              </a:solidFill>
+            </a:ln>
+          </p:spPr>
+          <p:style>
+            <a:lnRef idx="2">
+              <a:schemeClr val="accent1">
+                <a:shade val="50000"/>
+              </a:schemeClr>
+            </a:lnRef>
+            <a:fillRef idx="1">
+              <a:schemeClr val="accent1"/>
+            </a:fillRef>
+            <a:effectRef idx="0">
+              <a:schemeClr val="accent1"/>
+            </a:effectRef>
+            <a:fontRef idx="minor">
+              <a:schemeClr val="lt1"/>
+            </a:fontRef>
+          </p:style>
+          <p:txBody>
+            <a:bodyPr rtlCol="0" anchor="ctr"/>
+            <a:lstStyle/>
+            <a:p>
+              <a:pPr algn="ctr"/>
+              <a:endParaRPr lang="zh-TW" altLang="en-US"/>
+            </a:p>
+          </p:txBody>
+        </p:sp>
+        <p:sp>
+          <p:nvSpPr>
+            <p:cNvPr id="50" name="菱形 49"/>
+            <p:cNvSpPr/>
+            <p:nvPr/>
+          </p:nvSpPr>
+          <p:spPr>
+            <a:xfrm>
+              <a:off x="11186245" y="22980702"/>
+              <a:ext cx="6069659" cy="6442322"/>
+            </a:xfrm>
+            <a:prstGeom prst="diamond">
+              <a:avLst/>
+            </a:prstGeom>
+            <a:noFill/>
+            <a:ln w="38100">
+              <a:solidFill>
+                <a:srgbClr val="7EE2B2"/>
+              </a:solidFill>
+            </a:ln>
+          </p:spPr>
+          <p:style>
+            <a:lnRef idx="2">
+              <a:schemeClr val="accent1">
+                <a:shade val="50000"/>
+              </a:schemeClr>
+            </a:lnRef>
+            <a:fillRef idx="1">
+              <a:schemeClr val="accent1"/>
+            </a:fillRef>
+            <a:effectRef idx="0">
+              <a:schemeClr val="accent1"/>
+            </a:effectRef>
+            <a:fontRef idx="minor">
+              <a:schemeClr val="lt1"/>
+            </a:fontRef>
+          </p:style>
+          <p:txBody>
+            <a:bodyPr rtlCol="0" anchor="ctr"/>
+            <a:lstStyle/>
+            <a:p>
+              <a:pPr algn="ctr"/>
+              <a:endParaRPr lang="zh-TW" altLang="en-US"/>
+            </a:p>
+          </p:txBody>
+        </p:sp>
+      </p:grpSp>
+      <p:grpSp>
+        <p:nvGrpSpPr>
+          <p:cNvPr id="51" name="群組 50"/>
+          <p:cNvGrpSpPr/>
+          <p:nvPr/>
+        </p:nvGrpSpPr>
+        <p:grpSpPr>
+          <a:xfrm>
+            <a:off x="9652009" y="27092994"/>
+            <a:ext cx="3347046" cy="3978938"/>
+            <a:chOff x="11186245" y="22207464"/>
+            <a:chExt cx="6069662" cy="7215560"/>
+          </a:xfrm>
+        </p:grpSpPr>
+        <p:sp>
+          <p:nvSpPr>
+            <p:cNvPr id="52" name="菱形 51"/>
+            <p:cNvSpPr/>
+            <p:nvPr/>
+          </p:nvSpPr>
+          <p:spPr>
+            <a:xfrm>
+              <a:off x="11186248" y="22207464"/>
+              <a:ext cx="6069659" cy="6442322"/>
+            </a:xfrm>
+            <a:prstGeom prst="diamond">
+              <a:avLst/>
+            </a:prstGeom>
+            <a:noFill/>
+            <a:ln w="38100">
+              <a:solidFill>
+                <a:srgbClr val="7EE2B2"/>
+              </a:solidFill>
+            </a:ln>
+          </p:spPr>
+          <p:style>
+            <a:lnRef idx="2">
+              <a:schemeClr val="accent1">
+                <a:shade val="50000"/>
+              </a:schemeClr>
+            </a:lnRef>
+            <a:fillRef idx="1">
+              <a:schemeClr val="accent1"/>
+            </a:fillRef>
+            <a:effectRef idx="0">
+              <a:schemeClr val="accent1"/>
+            </a:effectRef>
+            <a:fontRef idx="minor">
+              <a:schemeClr val="lt1"/>
+            </a:fontRef>
+          </p:style>
+          <p:txBody>
+            <a:bodyPr rtlCol="0" anchor="ctr"/>
+            <a:lstStyle/>
+            <a:p>
+              <a:pPr algn="ctr"/>
+              <a:endParaRPr lang="zh-TW" altLang="en-US"/>
+            </a:p>
+          </p:txBody>
+        </p:sp>
+        <p:sp>
+          <p:nvSpPr>
+            <p:cNvPr id="53" name="菱形 52"/>
+            <p:cNvSpPr/>
+            <p:nvPr/>
+          </p:nvSpPr>
+          <p:spPr>
+            <a:xfrm>
+              <a:off x="11186247" y="22465210"/>
+              <a:ext cx="6069659" cy="6442322"/>
+            </a:xfrm>
+            <a:prstGeom prst="diamond">
+              <a:avLst/>
+            </a:prstGeom>
+            <a:noFill/>
+            <a:ln w="38100">
+              <a:solidFill>
+                <a:srgbClr val="7EE2B2"/>
+              </a:solidFill>
+            </a:ln>
+          </p:spPr>
+          <p:style>
+            <a:lnRef idx="2">
+              <a:schemeClr val="accent1">
+                <a:shade val="50000"/>
+              </a:schemeClr>
+            </a:lnRef>
+            <a:fillRef idx="1">
+              <a:schemeClr val="accent1"/>
+            </a:fillRef>
+            <a:effectRef idx="0">
+              <a:schemeClr val="accent1"/>
+            </a:effectRef>
+            <a:fontRef idx="minor">
+              <a:schemeClr val="lt1"/>
+            </a:fontRef>
+          </p:style>
+          <p:txBody>
+            <a:bodyPr rtlCol="0" anchor="ctr"/>
+            <a:lstStyle/>
+            <a:p>
+              <a:pPr algn="ctr"/>
+              <a:endParaRPr lang="zh-TW" altLang="en-US"/>
+            </a:p>
+          </p:txBody>
+        </p:sp>
+        <p:sp>
+          <p:nvSpPr>
+            <p:cNvPr id="54" name="菱形 53"/>
+            <p:cNvSpPr/>
+            <p:nvPr/>
+          </p:nvSpPr>
+          <p:spPr>
+            <a:xfrm>
+              <a:off x="11186246" y="22722956"/>
+              <a:ext cx="6069659" cy="6442322"/>
+            </a:xfrm>
+            <a:prstGeom prst="diamond">
+              <a:avLst/>
+            </a:prstGeom>
+            <a:noFill/>
+            <a:ln w="38100">
+              <a:solidFill>
+                <a:srgbClr val="7EE2B2"/>
+              </a:solidFill>
+            </a:ln>
+          </p:spPr>
+          <p:style>
+            <a:lnRef idx="2">
+              <a:schemeClr val="accent1">
+                <a:shade val="50000"/>
+              </a:schemeClr>
+            </a:lnRef>
+            <a:fillRef idx="1">
+              <a:schemeClr val="accent1"/>
+            </a:fillRef>
+            <a:effectRef idx="0">
+              <a:schemeClr val="accent1"/>
+            </a:effectRef>
+            <a:fontRef idx="minor">
+              <a:schemeClr val="lt1"/>
+            </a:fontRef>
+          </p:style>
+          <p:txBody>
+            <a:bodyPr rtlCol="0" anchor="ctr"/>
+            <a:lstStyle/>
+            <a:p>
+              <a:pPr algn="ctr"/>
+              <a:endParaRPr lang="zh-TW" altLang="en-US"/>
+            </a:p>
+          </p:txBody>
+        </p:sp>
+        <p:sp>
+          <p:nvSpPr>
+            <p:cNvPr id="55" name="菱形 54"/>
+            <p:cNvSpPr/>
+            <p:nvPr/>
+          </p:nvSpPr>
+          <p:spPr>
+            <a:xfrm>
+              <a:off x="11186245" y="22980702"/>
+              <a:ext cx="6069659" cy="6442322"/>
+            </a:xfrm>
+            <a:prstGeom prst="diamond">
+              <a:avLst/>
+            </a:prstGeom>
+            <a:noFill/>
+            <a:ln w="38100">
+              <a:solidFill>
+                <a:srgbClr val="7EE2B2"/>
+              </a:solidFill>
+            </a:ln>
+          </p:spPr>
+          <p:style>
+            <a:lnRef idx="2">
+              <a:schemeClr val="accent1">
+                <a:shade val="50000"/>
+              </a:schemeClr>
+            </a:lnRef>
+            <a:fillRef idx="1">
+              <a:schemeClr val="accent1"/>
+            </a:fillRef>
+            <a:effectRef idx="0">
+              <a:schemeClr val="accent1"/>
+            </a:effectRef>
+            <a:fontRef idx="minor">
+              <a:schemeClr val="lt1"/>
+            </a:fontRef>
+          </p:style>
+          <p:txBody>
+            <a:bodyPr rtlCol="0" anchor="ctr"/>
+            <a:lstStyle/>
+            <a:p>
+              <a:pPr algn="ctr"/>
+              <a:endParaRPr lang="zh-TW" altLang="en-US"/>
+            </a:p>
+          </p:txBody>
+        </p:sp>
+      </p:grpSp>
+      <p:sp>
+        <p:nvSpPr>
+          <p:cNvPr id="7" name="矩形 6"/>
+          <p:cNvSpPr/>
+          <p:nvPr/>
+        </p:nvSpPr>
+        <p:spPr>
+          <a:xfrm>
+            <a:off x="7918044" y="7999038"/>
+            <a:ext cx="2831690" cy="1209368"/>
+          </a:xfrm>
+          <a:prstGeom prst="rect">
+            <a:avLst/>
+          </a:prstGeom>
+          <a:solidFill>
+            <a:srgbClr val="E96A51">
+              <a:alpha val="92000"/>
+            </a:srgbClr>
+          </a:solidFill>
+          <a:ln>
+            <a:noFill/>
+          </a:ln>
+        </p:spPr>
+        <p:style>
+          <a:lnRef idx="2">
+            <a:schemeClr val="accent1">
+              <a:shade val="50000"/>
+            </a:schemeClr>
+          </a:lnRef>
+          <a:fillRef idx="1">
+            <a:schemeClr val="accent1"/>
+          </a:fillRef>
+          <a:effectRef idx="0">
+            <a:schemeClr val="accent1"/>
+          </a:effectRef>
+          <a:fontRef idx="minor">
+            <a:schemeClr val="lt1"/>
+          </a:fontRef>
+        </p:style>
+        <p:txBody>
+          <a:bodyPr rtlCol="0" anchor="ctr"/>
+          <a:lstStyle/>
+          <a:p>
+            <a:pPr algn="ctr"/>
+            <a:r>
+              <a:rPr lang="en-US" altLang="zh-TW" dirty="0">
+                <a:latin typeface="Courier New" panose="02070309020205020404" pitchFamily="49" charset="0"/>
+                <a:cs typeface="Courier New" panose="02070309020205020404" pitchFamily="49" charset="0"/>
+              </a:rPr>
+              <a:t>Projects</a:t>
+            </a:r>
+            <a:endParaRPr lang="zh-TW" altLang="en-US" dirty="0">
+              <a:latin typeface="Courier New" panose="02070309020205020404" pitchFamily="49" charset="0"/>
+              <a:cs typeface="Courier New" panose="02070309020205020404" pitchFamily="49" charset="0"/>
+            </a:endParaRPr>
+          </a:p>
+        </p:txBody>
+      </p:sp>
+      <p:sp>
+        <p:nvSpPr>
+          <p:cNvPr id="8" name="矩形 7"/>
+          <p:cNvSpPr/>
+          <p:nvPr/>
+        </p:nvSpPr>
+        <p:spPr>
+          <a:xfrm>
+            <a:off x="10897218" y="7999039"/>
+            <a:ext cx="2831690" cy="1209368"/>
+          </a:xfrm>
+          <a:prstGeom prst="rect">
+            <a:avLst/>
+          </a:prstGeom>
+          <a:solidFill>
+            <a:srgbClr val="ED3838">
+              <a:alpha val="92000"/>
+            </a:srgbClr>
+          </a:solidFill>
+          <a:ln>
+            <a:noFill/>
+          </a:ln>
+        </p:spPr>
+        <p:style>
+          <a:lnRef idx="2">
+            <a:schemeClr val="accent1">
+              <a:shade val="50000"/>
+            </a:schemeClr>
+          </a:lnRef>
+          <a:fillRef idx="1">
+            <a:schemeClr val="accent1"/>
+          </a:fillRef>
+          <a:effectRef idx="0">
+            <a:schemeClr val="accent1"/>
+          </a:effectRef>
+          <a:fontRef idx="minor">
+            <a:schemeClr val="lt1"/>
+          </a:fontRef>
+        </p:style>
+        <p:txBody>
+          <a:bodyPr rtlCol="0" anchor="ctr"/>
+          <a:lstStyle/>
+          <a:p>
+            <a:pPr algn="ctr"/>
+            <a:r>
+              <a:rPr lang="en-US" altLang="zh-TW" dirty="0">
+                <a:latin typeface="Courier New" panose="02070309020205020404" pitchFamily="49" charset="0"/>
+                <a:cs typeface="Courier New" panose="02070309020205020404" pitchFamily="49" charset="0"/>
+              </a:rPr>
+              <a:t>Works</a:t>
+            </a:r>
+            <a:endParaRPr lang="zh-TW" altLang="en-US" dirty="0">
+              <a:latin typeface="Courier New" panose="02070309020205020404" pitchFamily="49" charset="0"/>
+              <a:cs typeface="Courier New" panose="02070309020205020404" pitchFamily="49" charset="0"/>
+            </a:endParaRPr>
+          </a:p>
+        </p:txBody>
+      </p:sp>
+      <p:sp>
+        <p:nvSpPr>
+          <p:cNvPr id="5" name="文字方塊 4"/>
+          <p:cNvSpPr txBox="1"/>
+          <p:nvPr/>
+        </p:nvSpPr>
+        <p:spPr>
+          <a:xfrm>
+            <a:off x="3775285" y="10706798"/>
+            <a:ext cx="13868400" cy="13873029"/>
+          </a:xfrm>
+          <a:prstGeom prst="rect">
+            <a:avLst/>
+          </a:prstGeom>
+          <a:noFill/>
+        </p:spPr>
+        <p:txBody>
+          <a:bodyPr wrap="square" rtlCol="0">
+            <a:spAutoFit/>
+          </a:bodyPr>
+          <a:lstStyle/>
+          <a:p>
+            <a:pPr>
+              <a:lnSpc>
+                <a:spcPct val="150000"/>
+              </a:lnSpc>
+            </a:pPr>
+            <a:r>
+              <a:rPr lang="zh-TW" altLang="en-US" sz="3200" b="1" dirty="0" smtClean="0">
+                <a:solidFill>
+                  <a:srgbClr val="ED3838"/>
+                </a:solidFill>
+                <a:latin typeface="Noto Sans CJK TC Thin" panose="020B0200000000000000" pitchFamily="34" charset="-120"/>
+                <a:ea typeface="Noto Sans CJK TC Thin" panose="020B0200000000000000" pitchFamily="34" charset="-120"/>
+              </a:rPr>
+              <a:t>一</a:t>
+            </a:r>
+            <a:r>
+              <a:rPr lang="zh-TW" altLang="en-US" sz="3200" b="1" dirty="0">
+                <a:solidFill>
+                  <a:srgbClr val="ED3838"/>
+                </a:solidFill>
+                <a:latin typeface="Noto Sans CJK TC Thin" panose="020B0200000000000000" pitchFamily="34" charset="-120"/>
+                <a:ea typeface="Noto Sans CJK TC Thin" panose="020B0200000000000000" pitchFamily="34" charset="-120"/>
+              </a:rPr>
+              <a:t>、簡介：</a:t>
+            </a:r>
+          </a:p>
+          <a:p>
+            <a:pPr>
+              <a:lnSpc>
+                <a:spcPct val="150000"/>
+              </a:lnSpc>
+            </a:pPr>
+            <a:r>
+              <a:rPr lang="zh-TW" altLang="en-US" sz="3200" b="1" dirty="0">
+                <a:solidFill>
+                  <a:schemeClr val="bg1"/>
+                </a:solidFill>
+                <a:latin typeface="Noto Sans CJK TC Thin" panose="020B0200000000000000" pitchFamily="34" charset="-120"/>
+                <a:ea typeface="Noto Sans CJK TC Thin" panose="020B0200000000000000" pitchFamily="34" charset="-120"/>
+              </a:rPr>
+              <a:t>希望能夠藉由麥克風收音後，分析敲擊的聲音，進而分辨不同的敲擊並操控</a:t>
+            </a:r>
+            <a:r>
+              <a:rPr lang="en-US" altLang="zh-TW" sz="3200" b="1" dirty="0" err="1">
+                <a:solidFill>
+                  <a:schemeClr val="bg1"/>
+                </a:solidFill>
+                <a:latin typeface="Noto Sans CJK TC Thin" panose="020B0200000000000000" pitchFamily="34" charset="-120"/>
+                <a:ea typeface="Noto Sans CJK TC Thin" panose="020B0200000000000000" pitchFamily="34" charset="-120"/>
+              </a:rPr>
+              <a:t>PureData</a:t>
+            </a:r>
+            <a:r>
+              <a:rPr lang="zh-TW" altLang="en-US" sz="3200" b="1" dirty="0">
+                <a:solidFill>
+                  <a:schemeClr val="bg1"/>
+                </a:solidFill>
+                <a:latin typeface="Noto Sans CJK TC Thin" panose="020B0200000000000000" pitchFamily="34" charset="-120"/>
+                <a:ea typeface="Noto Sans CJK TC Thin" panose="020B0200000000000000" pitchFamily="34" charset="-120"/>
+              </a:rPr>
+              <a:t>來發出電子合成聲響。使用壓電片收集聲音再經過前級處理後由</a:t>
+            </a:r>
+            <a:r>
+              <a:rPr lang="en-US" altLang="zh-TW" sz="3200" b="1" dirty="0">
+                <a:solidFill>
+                  <a:schemeClr val="bg1"/>
+                </a:solidFill>
+                <a:latin typeface="Noto Sans CJK TC Thin" panose="020B0200000000000000" pitchFamily="34" charset="-120"/>
+                <a:ea typeface="Noto Sans CJK TC Thin" panose="020B0200000000000000" pitchFamily="34" charset="-120"/>
+              </a:rPr>
+              <a:t>MCP3204(ADC)</a:t>
+            </a:r>
+            <a:r>
+              <a:rPr lang="zh-TW" altLang="en-US" sz="3200" b="1" dirty="0">
+                <a:solidFill>
+                  <a:schemeClr val="bg1"/>
+                </a:solidFill>
+                <a:latin typeface="Noto Sans CJK TC Thin" panose="020B0200000000000000" pitchFamily="34" charset="-120"/>
+                <a:ea typeface="Noto Sans CJK TC Thin" panose="020B0200000000000000" pitchFamily="34" charset="-120"/>
+              </a:rPr>
+              <a:t>轉換成電子訊號透過</a:t>
+            </a:r>
+            <a:r>
+              <a:rPr lang="en-US" altLang="zh-TW" sz="3200" b="1" dirty="0">
+                <a:solidFill>
+                  <a:schemeClr val="bg1"/>
+                </a:solidFill>
+                <a:latin typeface="Noto Sans CJK TC Thin" panose="020B0200000000000000" pitchFamily="34" charset="-120"/>
+                <a:ea typeface="Noto Sans CJK TC Thin" panose="020B0200000000000000" pitchFamily="34" charset="-120"/>
+              </a:rPr>
+              <a:t>SPI</a:t>
+            </a:r>
+            <a:r>
+              <a:rPr lang="zh-TW" altLang="en-US" sz="3200" b="1" dirty="0">
+                <a:solidFill>
+                  <a:schemeClr val="bg1"/>
+                </a:solidFill>
+                <a:latin typeface="Noto Sans CJK TC Thin" panose="020B0200000000000000" pitchFamily="34" charset="-120"/>
+                <a:ea typeface="Noto Sans CJK TC Thin" panose="020B0200000000000000" pitchFamily="34" charset="-120"/>
+              </a:rPr>
+              <a:t>收到</a:t>
+            </a:r>
+            <a:r>
+              <a:rPr lang="en-US" altLang="zh-TW" sz="3200" b="1" dirty="0">
+                <a:solidFill>
+                  <a:schemeClr val="bg1"/>
+                </a:solidFill>
+                <a:latin typeface="Noto Sans CJK TC Thin" panose="020B0200000000000000" pitchFamily="34" charset="-120"/>
+                <a:ea typeface="Noto Sans CJK TC Thin" panose="020B0200000000000000" pitchFamily="34" charset="-120"/>
+              </a:rPr>
+              <a:t>Raspberry Pi</a:t>
+            </a:r>
+            <a:r>
+              <a:rPr lang="zh-TW" altLang="en-US" sz="3200" b="1" dirty="0">
+                <a:solidFill>
+                  <a:schemeClr val="bg1"/>
+                </a:solidFill>
+                <a:latin typeface="Noto Sans CJK TC Thin" panose="020B0200000000000000" pitchFamily="34" charset="-120"/>
+                <a:ea typeface="Noto Sans CJK TC Thin" panose="020B0200000000000000" pitchFamily="34" charset="-120"/>
+              </a:rPr>
+              <a:t>中處理。收集一小段資料後再將音訊資料餵給</a:t>
+            </a:r>
+            <a:r>
+              <a:rPr lang="en-US" altLang="zh-TW" sz="3200" b="1" dirty="0" err="1">
+                <a:solidFill>
+                  <a:schemeClr val="bg1"/>
+                </a:solidFill>
+                <a:latin typeface="Noto Sans CJK TC Thin" panose="020B0200000000000000" pitchFamily="34" charset="-120"/>
+                <a:ea typeface="Noto Sans CJK TC Thin" panose="020B0200000000000000" pitchFamily="34" charset="-120"/>
+              </a:rPr>
+              <a:t>PureData</a:t>
+            </a:r>
+            <a:r>
+              <a:rPr lang="zh-TW" altLang="en-US" sz="3200" b="1" dirty="0">
+                <a:solidFill>
+                  <a:schemeClr val="bg1"/>
+                </a:solidFill>
+                <a:latin typeface="Noto Sans CJK TC Thin" panose="020B0200000000000000" pitchFamily="34" charset="-120"/>
+                <a:ea typeface="Noto Sans CJK TC Thin" panose="020B0200000000000000" pitchFamily="34" charset="-120"/>
+              </a:rPr>
+              <a:t>做敲擊分析及發出聲響。</a:t>
+            </a:r>
+          </a:p>
+          <a:p>
+            <a:pPr>
+              <a:lnSpc>
+                <a:spcPct val="150000"/>
+              </a:lnSpc>
+            </a:pPr>
+            <a:endParaRPr lang="en-US" altLang="zh-TW" sz="3200" b="1" dirty="0" smtClean="0">
+              <a:solidFill>
+                <a:schemeClr val="bg1"/>
+              </a:solidFill>
+              <a:latin typeface="Noto Sans CJK TC Thin" panose="020B0200000000000000" pitchFamily="34" charset="-120"/>
+              <a:ea typeface="Noto Sans CJK TC Thin" panose="020B0200000000000000" pitchFamily="34" charset="-120"/>
+            </a:endParaRPr>
+          </a:p>
+          <a:p>
+            <a:pPr>
+              <a:lnSpc>
+                <a:spcPct val="150000"/>
+              </a:lnSpc>
+            </a:pPr>
+            <a:r>
+              <a:rPr lang="zh-TW" altLang="en-US" sz="3200" b="1" dirty="0">
+                <a:solidFill>
+                  <a:srgbClr val="ED3838"/>
+                </a:solidFill>
+                <a:latin typeface="Noto Sans CJK TC Thin" panose="020B0200000000000000" pitchFamily="34" charset="-120"/>
+                <a:ea typeface="Noto Sans CJK TC Thin" panose="020B0200000000000000" pitchFamily="34" charset="-120"/>
+              </a:rPr>
+              <a:t>一、簡介：</a:t>
+            </a:r>
+          </a:p>
+          <a:p>
+            <a:pPr>
+              <a:lnSpc>
+                <a:spcPct val="150000"/>
+              </a:lnSpc>
+            </a:pPr>
+            <a:r>
+              <a:rPr lang="zh-TW" altLang="en-US" sz="3200" b="1" dirty="0">
+                <a:solidFill>
+                  <a:schemeClr val="bg1"/>
+                </a:solidFill>
+                <a:latin typeface="Noto Sans CJK TC Thin" panose="020B0200000000000000" pitchFamily="34" charset="-120"/>
+                <a:ea typeface="Noto Sans CJK TC Thin" panose="020B0200000000000000" pitchFamily="34" charset="-120"/>
+              </a:rPr>
+              <a:t>希望能夠藉由麥克風收音後，分析敲擊的聲音，進而分辨不同的敲擊並操控</a:t>
+            </a:r>
+            <a:r>
+              <a:rPr lang="en-US" altLang="zh-TW" sz="3200" b="1" dirty="0" err="1">
+                <a:solidFill>
+                  <a:schemeClr val="bg1"/>
+                </a:solidFill>
+                <a:latin typeface="Noto Sans CJK TC Thin" panose="020B0200000000000000" pitchFamily="34" charset="-120"/>
+                <a:ea typeface="Noto Sans CJK TC Thin" panose="020B0200000000000000" pitchFamily="34" charset="-120"/>
+              </a:rPr>
+              <a:t>PureData</a:t>
+            </a:r>
+            <a:r>
+              <a:rPr lang="zh-TW" altLang="en-US" sz="3200" b="1" dirty="0">
+                <a:solidFill>
+                  <a:schemeClr val="bg1"/>
+                </a:solidFill>
+                <a:latin typeface="Noto Sans CJK TC Thin" panose="020B0200000000000000" pitchFamily="34" charset="-120"/>
+                <a:ea typeface="Noto Sans CJK TC Thin" panose="020B0200000000000000" pitchFamily="34" charset="-120"/>
+              </a:rPr>
+              <a:t>來發出電子合成聲響。使用壓電片收集聲音再經過前級處理後由</a:t>
+            </a:r>
+            <a:r>
+              <a:rPr lang="en-US" altLang="zh-TW" sz="3200" b="1" dirty="0">
+                <a:solidFill>
+                  <a:schemeClr val="bg1"/>
+                </a:solidFill>
+                <a:latin typeface="Noto Sans CJK TC Thin" panose="020B0200000000000000" pitchFamily="34" charset="-120"/>
+                <a:ea typeface="Noto Sans CJK TC Thin" panose="020B0200000000000000" pitchFamily="34" charset="-120"/>
+              </a:rPr>
+              <a:t>MCP3204(ADC)</a:t>
+            </a:r>
+            <a:r>
+              <a:rPr lang="zh-TW" altLang="en-US" sz="3200" b="1" dirty="0">
+                <a:solidFill>
+                  <a:schemeClr val="bg1"/>
+                </a:solidFill>
+                <a:latin typeface="Noto Sans CJK TC Thin" panose="020B0200000000000000" pitchFamily="34" charset="-120"/>
+                <a:ea typeface="Noto Sans CJK TC Thin" panose="020B0200000000000000" pitchFamily="34" charset="-120"/>
+              </a:rPr>
+              <a:t>轉換成電子訊號透過</a:t>
+            </a:r>
+            <a:r>
+              <a:rPr lang="en-US" altLang="zh-TW" sz="3200" b="1" dirty="0">
+                <a:solidFill>
+                  <a:schemeClr val="bg1"/>
+                </a:solidFill>
+                <a:latin typeface="Noto Sans CJK TC Thin" panose="020B0200000000000000" pitchFamily="34" charset="-120"/>
+                <a:ea typeface="Noto Sans CJK TC Thin" panose="020B0200000000000000" pitchFamily="34" charset="-120"/>
+              </a:rPr>
+              <a:t>SPI</a:t>
+            </a:r>
+            <a:r>
+              <a:rPr lang="zh-TW" altLang="en-US" sz="3200" b="1" dirty="0">
+                <a:solidFill>
+                  <a:schemeClr val="bg1"/>
+                </a:solidFill>
+                <a:latin typeface="Noto Sans CJK TC Thin" panose="020B0200000000000000" pitchFamily="34" charset="-120"/>
+                <a:ea typeface="Noto Sans CJK TC Thin" panose="020B0200000000000000" pitchFamily="34" charset="-120"/>
+              </a:rPr>
+              <a:t>收到</a:t>
+            </a:r>
+            <a:r>
+              <a:rPr lang="en-US" altLang="zh-TW" sz="3200" b="1" dirty="0">
+                <a:solidFill>
+                  <a:schemeClr val="bg1"/>
+                </a:solidFill>
+                <a:latin typeface="Noto Sans CJK TC Thin" panose="020B0200000000000000" pitchFamily="34" charset="-120"/>
+                <a:ea typeface="Noto Sans CJK TC Thin" panose="020B0200000000000000" pitchFamily="34" charset="-120"/>
+              </a:rPr>
+              <a:t>Raspberry Pi</a:t>
+            </a:r>
+            <a:r>
+              <a:rPr lang="zh-TW" altLang="en-US" sz="3200" b="1" dirty="0">
+                <a:solidFill>
+                  <a:schemeClr val="bg1"/>
+                </a:solidFill>
+                <a:latin typeface="Noto Sans CJK TC Thin" panose="020B0200000000000000" pitchFamily="34" charset="-120"/>
+                <a:ea typeface="Noto Sans CJK TC Thin" panose="020B0200000000000000" pitchFamily="34" charset="-120"/>
+              </a:rPr>
+              <a:t>中處理。收集一小段資料後再將音訊資料餵給</a:t>
+            </a:r>
+            <a:r>
+              <a:rPr lang="en-US" altLang="zh-TW" sz="3200" b="1" dirty="0" err="1">
+                <a:solidFill>
+                  <a:schemeClr val="bg1"/>
+                </a:solidFill>
+                <a:latin typeface="Noto Sans CJK TC Thin" panose="020B0200000000000000" pitchFamily="34" charset="-120"/>
+                <a:ea typeface="Noto Sans CJK TC Thin" panose="020B0200000000000000" pitchFamily="34" charset="-120"/>
+              </a:rPr>
+              <a:t>PureData</a:t>
+            </a:r>
+            <a:r>
+              <a:rPr lang="zh-TW" altLang="en-US" sz="3200" b="1" dirty="0">
+                <a:solidFill>
+                  <a:schemeClr val="bg1"/>
+                </a:solidFill>
+                <a:latin typeface="Noto Sans CJK TC Thin" panose="020B0200000000000000" pitchFamily="34" charset="-120"/>
+                <a:ea typeface="Noto Sans CJK TC Thin" panose="020B0200000000000000" pitchFamily="34" charset="-120"/>
+              </a:rPr>
+              <a:t>做敲擊分析及發出聲響。</a:t>
+            </a:r>
+          </a:p>
+          <a:p>
+            <a:pPr>
+              <a:lnSpc>
+                <a:spcPct val="150000"/>
+              </a:lnSpc>
+            </a:pPr>
+            <a:endParaRPr lang="en-US" altLang="zh-TW" sz="3200" b="1" dirty="0" smtClean="0">
+              <a:solidFill>
+                <a:schemeClr val="bg1"/>
+              </a:solidFill>
+              <a:latin typeface="Noto Sans CJK TC Thin" panose="020B0200000000000000" pitchFamily="34" charset="-120"/>
+              <a:ea typeface="Noto Sans CJK TC Thin" panose="020B0200000000000000" pitchFamily="34" charset="-120"/>
+            </a:endParaRPr>
+          </a:p>
+          <a:p>
+            <a:pPr>
+              <a:lnSpc>
+                <a:spcPct val="150000"/>
+              </a:lnSpc>
+            </a:pPr>
+            <a:r>
+              <a:rPr lang="zh-TW" altLang="en-US" sz="3200" b="1" dirty="0">
+                <a:solidFill>
+                  <a:srgbClr val="ED3838"/>
+                </a:solidFill>
+                <a:latin typeface="Noto Sans CJK TC Thin" panose="020B0200000000000000" pitchFamily="34" charset="-120"/>
+                <a:ea typeface="Noto Sans CJK TC Thin" panose="020B0200000000000000" pitchFamily="34" charset="-120"/>
+              </a:rPr>
+              <a:t>一、簡介：</a:t>
+            </a:r>
+          </a:p>
+          <a:p>
+            <a:pPr>
+              <a:lnSpc>
+                <a:spcPct val="150000"/>
+              </a:lnSpc>
+            </a:pPr>
+            <a:r>
+              <a:rPr lang="zh-TW" altLang="en-US" sz="3200" b="1" dirty="0">
+                <a:solidFill>
+                  <a:schemeClr val="bg1"/>
+                </a:solidFill>
+                <a:latin typeface="Noto Sans CJK TC Thin" panose="020B0200000000000000" pitchFamily="34" charset="-120"/>
+                <a:ea typeface="Noto Sans CJK TC Thin" panose="020B0200000000000000" pitchFamily="34" charset="-120"/>
+              </a:rPr>
+              <a:t>希望能夠藉由麥克風收音後，分析敲擊的聲音，進而分辨不同的敲擊並操控</a:t>
+            </a:r>
+            <a:r>
+              <a:rPr lang="en-US" altLang="zh-TW" sz="3200" b="1" dirty="0" err="1">
+                <a:solidFill>
+                  <a:schemeClr val="bg1"/>
+                </a:solidFill>
+                <a:latin typeface="Noto Sans CJK TC Thin" panose="020B0200000000000000" pitchFamily="34" charset="-120"/>
+                <a:ea typeface="Noto Sans CJK TC Thin" panose="020B0200000000000000" pitchFamily="34" charset="-120"/>
+              </a:rPr>
+              <a:t>PureData</a:t>
+            </a:r>
+            <a:r>
+              <a:rPr lang="zh-TW" altLang="en-US" sz="3200" b="1" dirty="0">
+                <a:solidFill>
+                  <a:schemeClr val="bg1"/>
+                </a:solidFill>
+                <a:latin typeface="Noto Sans CJK TC Thin" panose="020B0200000000000000" pitchFamily="34" charset="-120"/>
+                <a:ea typeface="Noto Sans CJK TC Thin" panose="020B0200000000000000" pitchFamily="34" charset="-120"/>
+              </a:rPr>
+              <a:t>來發出電子合成聲響。使用壓電片收集聲音再經過前級處理後由</a:t>
+            </a:r>
+            <a:r>
+              <a:rPr lang="en-US" altLang="zh-TW" sz="3200" b="1" dirty="0">
+                <a:solidFill>
+                  <a:schemeClr val="bg1"/>
+                </a:solidFill>
+                <a:latin typeface="Noto Sans CJK TC Thin" panose="020B0200000000000000" pitchFamily="34" charset="-120"/>
+                <a:ea typeface="Noto Sans CJK TC Thin" panose="020B0200000000000000" pitchFamily="34" charset="-120"/>
+              </a:rPr>
+              <a:t>MCP3204(ADC)</a:t>
+            </a:r>
+            <a:r>
+              <a:rPr lang="zh-TW" altLang="en-US" sz="3200" b="1" dirty="0">
+                <a:solidFill>
+                  <a:schemeClr val="bg1"/>
+                </a:solidFill>
+                <a:latin typeface="Noto Sans CJK TC Thin" panose="020B0200000000000000" pitchFamily="34" charset="-120"/>
+                <a:ea typeface="Noto Sans CJK TC Thin" panose="020B0200000000000000" pitchFamily="34" charset="-120"/>
+              </a:rPr>
+              <a:t>轉換成電子訊號透過</a:t>
+            </a:r>
+            <a:r>
+              <a:rPr lang="en-US" altLang="zh-TW" sz="3200" b="1" dirty="0">
+                <a:solidFill>
+                  <a:schemeClr val="bg1"/>
+                </a:solidFill>
+                <a:latin typeface="Noto Sans CJK TC Thin" panose="020B0200000000000000" pitchFamily="34" charset="-120"/>
+                <a:ea typeface="Noto Sans CJK TC Thin" panose="020B0200000000000000" pitchFamily="34" charset="-120"/>
+              </a:rPr>
+              <a:t>SPI</a:t>
+            </a:r>
+            <a:r>
+              <a:rPr lang="zh-TW" altLang="en-US" sz="3200" b="1" dirty="0">
+                <a:solidFill>
+                  <a:schemeClr val="bg1"/>
+                </a:solidFill>
+                <a:latin typeface="Noto Sans CJK TC Thin" panose="020B0200000000000000" pitchFamily="34" charset="-120"/>
+                <a:ea typeface="Noto Sans CJK TC Thin" panose="020B0200000000000000" pitchFamily="34" charset="-120"/>
+              </a:rPr>
+              <a:t>收到</a:t>
+            </a:r>
+            <a:r>
+              <a:rPr lang="en-US" altLang="zh-TW" sz="3200" b="1" dirty="0">
+                <a:solidFill>
+                  <a:schemeClr val="bg1"/>
+                </a:solidFill>
+                <a:latin typeface="Noto Sans CJK TC Thin" panose="020B0200000000000000" pitchFamily="34" charset="-120"/>
+                <a:ea typeface="Noto Sans CJK TC Thin" panose="020B0200000000000000" pitchFamily="34" charset="-120"/>
+              </a:rPr>
+              <a:t>Raspberry Pi</a:t>
+            </a:r>
+            <a:r>
+              <a:rPr lang="zh-TW" altLang="en-US" sz="3200" b="1" dirty="0">
+                <a:solidFill>
+                  <a:schemeClr val="bg1"/>
+                </a:solidFill>
+                <a:latin typeface="Noto Sans CJK TC Thin" panose="020B0200000000000000" pitchFamily="34" charset="-120"/>
+                <a:ea typeface="Noto Sans CJK TC Thin" panose="020B0200000000000000" pitchFamily="34" charset="-120"/>
+              </a:rPr>
+              <a:t>中處理。收集一小段資料後再將音訊資料餵給</a:t>
+            </a:r>
+            <a:r>
+              <a:rPr lang="en-US" altLang="zh-TW" sz="3200" b="1" dirty="0" err="1">
+                <a:solidFill>
+                  <a:schemeClr val="bg1"/>
+                </a:solidFill>
+                <a:latin typeface="Noto Sans CJK TC Thin" panose="020B0200000000000000" pitchFamily="34" charset="-120"/>
+                <a:ea typeface="Noto Sans CJK TC Thin" panose="020B0200000000000000" pitchFamily="34" charset="-120"/>
+              </a:rPr>
+              <a:t>PureData</a:t>
+            </a:r>
+            <a:r>
+              <a:rPr lang="zh-TW" altLang="en-US" sz="3200" b="1" dirty="0">
+                <a:solidFill>
+                  <a:schemeClr val="bg1"/>
+                </a:solidFill>
+                <a:latin typeface="Noto Sans CJK TC Thin" panose="020B0200000000000000" pitchFamily="34" charset="-120"/>
+                <a:ea typeface="Noto Sans CJK TC Thin" panose="020B0200000000000000" pitchFamily="34" charset="-120"/>
+              </a:rPr>
+              <a:t>做敲擊分析及發出聲響。</a:t>
+            </a:r>
+          </a:p>
+          <a:p>
+            <a:pPr>
+              <a:lnSpc>
+                <a:spcPct val="150000"/>
+              </a:lnSpc>
+            </a:pPr>
+            <a:endParaRPr lang="zh-TW" altLang="en-US" sz="3200" b="1" dirty="0" smtClean="0">
+              <a:solidFill>
+                <a:schemeClr val="bg1"/>
+              </a:solidFill>
+              <a:latin typeface="Noto Sans CJK TC Thin" panose="020B0200000000000000" pitchFamily="34" charset="-120"/>
+              <a:ea typeface="Noto Sans CJK TC Thin" panose="020B0200000000000000" pitchFamily="34" charset="-120"/>
+            </a:endParaRPr>
+          </a:p>
+          <a:p>
+            <a:endParaRPr lang="zh-TW" altLang="en-US" dirty="0">
+              <a:solidFill>
+                <a:schemeClr val="bg1"/>
+              </a:solidFill>
+            </a:endParaRPr>
+          </a:p>
+        </p:txBody>
+      </p:sp>
+    </p:spTree>
+    <p:extLst>
+      <p:ext uri="{BB962C8B-B14F-4D97-AF65-F5344CB8AC3E}">
+        <p14:creationId xmlns:p14="http://schemas.microsoft.com/office/powerpoint/2010/main" val="579927006"/>
+      </p:ext>
+    </p:extLst>
+  </p:cSld>
+  <p:clrMapOvr>
+    <a:masterClrMapping/>
+  </p:clrMapOvr>
+  <p:timing>
+    <p:tnLst>
+      <p:par>
+        <p:cTn id="1" dur="indefinite" restart="never" nodeType="tmRoot"/>
+      </p:par>
+    </p:tnLst>
+  </p:timing>
+</p:sld>
+</file>
+
+<file path=ppt/slides/slide4.xml><?xml version="1.0" encoding="utf-8"?>
+<p:sld xmlns:a="http://schemas.openxmlformats.org/drawingml/2006/main" xmlns:r="http://schemas.openxmlformats.org/officeDocument/2006/relationships" xmlns:p="http://schemas.openxmlformats.org/presentationml/2006/main">
+  <p:cSld>
+    <p:bg>
+      <p:bgPr>
+        <a:solidFill>
+          <a:srgbClr val="342B39"/>
+        </a:solidFill>
+        <a:effectLst/>
+      </p:bgPr>
+    </p:bg>
+    <p:spTree>
+      <p:nvGrpSpPr>
+        <p:cNvPr id="1" name=""/>
+        <p:cNvGrpSpPr/>
+        <p:nvPr/>
+      </p:nvGrpSpPr>
+      <p:grpSpPr>
+        <a:xfrm>
+          <a:off x="0" y="0"/>
+          <a:ext cx="0" cy="0"/>
+          <a:chOff x="0" y="0"/>
+          <a:chExt cx="0" cy="0"/>
+        </a:xfrm>
+      </p:grpSpPr>
+      <p:grpSp>
+        <p:nvGrpSpPr>
+          <p:cNvPr id="18" name="群組 17"/>
+          <p:cNvGrpSpPr/>
+          <p:nvPr/>
+        </p:nvGrpSpPr>
+        <p:grpSpPr>
+          <a:xfrm>
+            <a:off x="7674656" y="25594602"/>
+            <a:ext cx="6069659" cy="6442322"/>
+            <a:chOff x="7734767" y="12701009"/>
+            <a:chExt cx="6069659" cy="6442322"/>
+          </a:xfrm>
+        </p:grpSpPr>
+        <p:sp>
+          <p:nvSpPr>
+            <p:cNvPr id="19" name="菱形 18"/>
+            <p:cNvSpPr/>
+            <p:nvPr/>
+          </p:nvSpPr>
+          <p:spPr>
+            <a:xfrm>
+              <a:off x="7734767" y="12701009"/>
+              <a:ext cx="6069659" cy="6442322"/>
+            </a:xfrm>
+            <a:prstGeom prst="diamond">
+              <a:avLst/>
+            </a:prstGeom>
+            <a:solidFill>
+              <a:srgbClr val="C3C33D"/>
+            </a:solidFill>
+            <a:ln>
+              <a:noFill/>
+            </a:ln>
+          </p:spPr>
+          <p:style>
+            <a:lnRef idx="2">
+              <a:schemeClr val="accent1">
+                <a:shade val="50000"/>
+              </a:schemeClr>
+            </a:lnRef>
+            <a:fillRef idx="1">
+              <a:schemeClr val="accent1"/>
+            </a:fillRef>
+            <a:effectRef idx="0">
+              <a:schemeClr val="accent1"/>
+            </a:effectRef>
+            <a:fontRef idx="minor">
+              <a:schemeClr val="lt1"/>
+            </a:fontRef>
+          </p:style>
+          <p:txBody>
+            <a:bodyPr rtlCol="0" anchor="ctr"/>
+            <a:lstStyle/>
+            <a:p>
+              <a:pPr algn="ctr"/>
+              <a:endParaRPr lang="zh-TW" altLang="en-US"/>
+            </a:p>
+          </p:txBody>
+        </p:sp>
+        <p:sp>
+          <p:nvSpPr>
+            <p:cNvPr id="21" name="矩形 20"/>
+            <p:cNvSpPr/>
+            <p:nvPr/>
+          </p:nvSpPr>
+          <p:spPr>
+            <a:xfrm rot="5400000">
+              <a:off x="9980170" y="16452123"/>
+              <a:ext cx="1636987" cy="577081"/>
+            </a:xfrm>
+            <a:prstGeom prst="rect">
+              <a:avLst/>
+            </a:prstGeom>
+          </p:spPr>
+          <p:txBody>
+            <a:bodyPr vert="horz" wrap="none">
+              <a:spAutoFit/>
+            </a:bodyPr>
+            <a:lstStyle/>
+            <a:p>
+              <a:r>
+                <a:rPr lang="en-US" altLang="zh-TW" dirty="0" smtClean="0">
+                  <a:solidFill>
+                    <a:srgbClr val="283C3C"/>
+                  </a:solidFill>
+                  <a:latin typeface="Courier New" panose="02070309020205020404" pitchFamily="49" charset="0"/>
+                  <a:cs typeface="Courier New" panose="02070309020205020404" pitchFamily="49" charset="0"/>
+                </a:rPr>
+                <a:t>KlareH</a:t>
+              </a:r>
+              <a:endParaRPr lang="zh-TW" altLang="en-US" dirty="0">
+                <a:solidFill>
+                  <a:srgbClr val="283C3C"/>
+                </a:solidFill>
+                <a:latin typeface="Courier New" panose="02070309020205020404" pitchFamily="49" charset="0"/>
+                <a:cs typeface="Courier New" panose="02070309020205020404" pitchFamily="49" charset="0"/>
+              </a:endParaRPr>
+            </a:p>
+          </p:txBody>
+        </p:sp>
+      </p:grpSp>
+      <p:sp>
+        <p:nvSpPr>
+          <p:cNvPr id="104" name="矩形 103"/>
+          <p:cNvSpPr/>
+          <p:nvPr/>
+        </p:nvSpPr>
+        <p:spPr>
+          <a:xfrm>
+            <a:off x="-1866900" y="10122806"/>
+            <a:ext cx="25298400" cy="14557397"/>
+          </a:xfrm>
+          <a:prstGeom prst="rect">
+            <a:avLst/>
+          </a:prstGeom>
+          <a:solidFill>
+            <a:srgbClr val="7EE2B2">
+              <a:alpha val="10000"/>
+            </a:srgbClr>
+          </a:solidFill>
+          <a:ln w="63500">
+            <a:noFill/>
+          </a:ln>
+        </p:spPr>
+        <p:style>
+          <a:lnRef idx="2">
+            <a:schemeClr val="accent1">
+              <a:shade val="50000"/>
+            </a:schemeClr>
+          </a:lnRef>
+          <a:fillRef idx="1">
+            <a:schemeClr val="accent1"/>
+          </a:fillRef>
+          <a:effectRef idx="0">
+            <a:schemeClr val="accent1"/>
+          </a:effectRef>
+          <a:fontRef idx="minor">
+            <a:schemeClr val="lt1"/>
+          </a:fontRef>
+        </p:style>
+        <p:txBody>
+          <a:bodyPr rot="0" spcFirstLastPara="0" vertOverflow="overflow" horzOverflow="overflow" vert="horz" wrap="square" lIns="91439" tIns="45720" rIns="91439" bIns="45720" numCol="1" spcCol="0" rtlCol="0" fromWordArt="0" anchor="ctr" anchorCtr="0" forceAA="0" compatLnSpc="1">
+            <a:prstTxWarp prst="textNoShape">
+              <a:avLst/>
+            </a:prstTxWarp>
+            <a:noAutofit/>
+          </a:bodyPr>
+          <a:lstStyle/>
+          <a:p>
+            <a:pPr>
+              <a:lnSpc>
+                <a:spcPct val="150000"/>
+              </a:lnSpc>
+            </a:pPr>
+            <a:endParaRPr lang="zh-TW" altLang="en-US" sz="7200" dirty="0">
+              <a:latin typeface="Noto Sans CJK TC Thin" panose="020B0200000000000000" pitchFamily="34" charset="-120"/>
+              <a:ea typeface="Noto Sans CJK TC Thin" panose="020B0200000000000000" pitchFamily="34" charset="-120"/>
+            </a:endParaRPr>
+          </a:p>
+        </p:txBody>
+      </p:sp>
+      <p:sp>
+        <p:nvSpPr>
+          <p:cNvPr id="2" name="矩形 1"/>
+          <p:cNvSpPr/>
+          <p:nvPr/>
+        </p:nvSpPr>
+        <p:spPr>
+          <a:xfrm>
+            <a:off x="4938870" y="7999038"/>
+            <a:ext cx="2831690" cy="1209368"/>
+          </a:xfrm>
+          <a:prstGeom prst="rect">
+            <a:avLst/>
+          </a:prstGeom>
+          <a:solidFill>
+            <a:srgbClr val="E96A51">
+              <a:alpha val="92000"/>
+            </a:srgbClr>
+          </a:solidFill>
+          <a:ln>
+            <a:noFill/>
+          </a:ln>
+        </p:spPr>
+        <p:style>
+          <a:lnRef idx="2">
+            <a:schemeClr val="accent1">
+              <a:shade val="50000"/>
+            </a:schemeClr>
+          </a:lnRef>
+          <a:fillRef idx="1">
+            <a:schemeClr val="accent1"/>
+          </a:fillRef>
+          <a:effectRef idx="0">
+            <a:schemeClr val="accent1"/>
+          </a:effectRef>
+          <a:fontRef idx="minor">
+            <a:schemeClr val="lt1"/>
+          </a:fontRef>
+        </p:style>
+        <p:txBody>
+          <a:bodyPr rtlCol="0" anchor="ctr"/>
+          <a:lstStyle/>
+          <a:p>
+            <a:pPr algn="ctr"/>
+            <a:r>
+              <a:rPr lang="en-US" altLang="zh-TW" dirty="0" smtClean="0">
+                <a:latin typeface="Courier New" panose="02070309020205020404" pitchFamily="49" charset="0"/>
+                <a:cs typeface="Courier New" panose="02070309020205020404" pitchFamily="49" charset="0"/>
+              </a:rPr>
+              <a:t>About KH</a:t>
+            </a:r>
+            <a:endParaRPr lang="zh-TW" altLang="en-US" dirty="0">
+              <a:latin typeface="Courier New" panose="02070309020205020404" pitchFamily="49" charset="0"/>
+              <a:cs typeface="Courier New" panose="02070309020205020404" pitchFamily="49" charset="0"/>
+            </a:endParaRPr>
+          </a:p>
+        </p:txBody>
+      </p:sp>
+      <p:sp>
+        <p:nvSpPr>
+          <p:cNvPr id="9" name="矩形 8"/>
+          <p:cNvSpPr/>
+          <p:nvPr/>
+        </p:nvSpPr>
+        <p:spPr>
+          <a:xfrm>
+            <a:off x="13861647" y="7999038"/>
+            <a:ext cx="2831690" cy="1209368"/>
+          </a:xfrm>
+          <a:prstGeom prst="rect">
+            <a:avLst/>
+          </a:prstGeom>
+          <a:solidFill>
+            <a:srgbClr val="E96A51">
+              <a:alpha val="92000"/>
+            </a:srgbClr>
+          </a:solidFill>
+          <a:ln>
+            <a:noFill/>
+          </a:ln>
+        </p:spPr>
+        <p:style>
+          <a:lnRef idx="2">
+            <a:schemeClr val="accent1">
+              <a:shade val="50000"/>
+            </a:schemeClr>
+          </a:lnRef>
+          <a:fillRef idx="1">
+            <a:schemeClr val="accent1"/>
+          </a:fillRef>
+          <a:effectRef idx="0">
+            <a:schemeClr val="accent1"/>
+          </a:effectRef>
+          <a:fontRef idx="minor">
+            <a:schemeClr val="lt1"/>
+          </a:fontRef>
+        </p:style>
+        <p:txBody>
+          <a:bodyPr rtlCol="0" anchor="ctr"/>
+          <a:lstStyle/>
+          <a:p>
+            <a:pPr algn="ctr"/>
+            <a:r>
+              <a:rPr lang="en-US" altLang="zh-TW" dirty="0">
+                <a:latin typeface="Courier New" panose="02070309020205020404" pitchFamily="49" charset="0"/>
+                <a:cs typeface="Courier New" panose="02070309020205020404" pitchFamily="49" charset="0"/>
+              </a:rPr>
+              <a:t>Blogs</a:t>
+            </a:r>
+            <a:endParaRPr lang="zh-TW" altLang="en-US" dirty="0">
+              <a:latin typeface="Courier New" panose="02070309020205020404" pitchFamily="49" charset="0"/>
+              <a:cs typeface="Courier New" panose="02070309020205020404" pitchFamily="49" charset="0"/>
+            </a:endParaRPr>
+          </a:p>
+        </p:txBody>
+      </p:sp>
+      <p:grpSp>
+        <p:nvGrpSpPr>
+          <p:cNvPr id="11" name="群組 10"/>
+          <p:cNvGrpSpPr/>
+          <p:nvPr/>
+        </p:nvGrpSpPr>
+        <p:grpSpPr>
+          <a:xfrm>
             <a:off x="7770560" y="937271"/>
             <a:ext cx="6069659" cy="6442322"/>
             <a:chOff x="7734767" y="12701009"/>
@@ -8538,7 +10867,7 @@
     </p:spTree>
     <p:extLst>
       <p:ext uri="{BB962C8B-B14F-4D97-AF65-F5344CB8AC3E}">
-        <p14:creationId xmlns:p14="http://schemas.microsoft.com/office/powerpoint/2010/main" val="579927006"/>
+        <p14:creationId xmlns:p14="http://schemas.microsoft.com/office/powerpoint/2010/main" val="2472033645"/>
       </p:ext>
     </p:extLst>
   </p:cSld>
@@ -8555,7 +10884,7 @@
 </p:sld>
 </file>
 
-<file path=ppt/slides/slide4.xml><?xml version="1.0" encoding="utf-8"?>
+<file path=ppt/slides/slide5.xml><?xml version="1.0" encoding="utf-8"?>
 <p:sld xmlns:a="http://schemas.openxmlformats.org/drawingml/2006/main" xmlns:r="http://schemas.openxmlformats.org/officeDocument/2006/relationships" xmlns:p="http://schemas.openxmlformats.org/presentationml/2006/main">
   <p:cSld>
     <p:bg>
@@ -11210,7 +13539,7 @@
 </p:sld>
 </file>
 
-<file path=ppt/slides/slide5.xml><?xml version="1.0" encoding="utf-8"?>
+<file path=ppt/slides/slide6.xml><?xml version="1.0" encoding="utf-8"?>
 <p:sld xmlns:a="http://schemas.openxmlformats.org/drawingml/2006/main" xmlns:r="http://schemas.openxmlformats.org/officeDocument/2006/relationships" xmlns:p="http://schemas.openxmlformats.org/presentationml/2006/main" show="0">
   <p:cSld>
     <p:bg>
@@ -11235,6 +13564,56 @@
           <a:chExt cx="0" cy="0"/>
         </a:xfrm>
       </p:grpSpPr>
+      <p:sp>
+        <p:nvSpPr>
+          <p:cNvPr id="8" name="等腰三角形 7"/>
+          <p:cNvSpPr/>
+          <p:nvPr/>
+        </p:nvSpPr>
+        <p:spPr>
+          <a:xfrm>
+            <a:off x="6644062" y="14799560"/>
+            <a:ext cx="1871124" cy="1453282"/>
+          </a:xfrm>
+          <a:prstGeom prst="triangle">
+            <a:avLst/>
+          </a:prstGeom>
+          <a:solidFill>
+            <a:srgbClr val="C3C33D"/>
+          </a:solidFill>
+          <a:ln>
+            <a:noFill/>
+          </a:ln>
+        </p:spPr>
+        <p:style>
+          <a:lnRef idx="2">
+            <a:schemeClr val="accent1">
+              <a:shade val="50000"/>
+            </a:schemeClr>
+          </a:lnRef>
+          <a:fillRef idx="1">
+            <a:schemeClr val="accent1"/>
+          </a:fillRef>
+          <a:effectRef idx="0">
+            <a:schemeClr val="accent1"/>
+          </a:effectRef>
+          <a:fontRef idx="minor">
+            <a:schemeClr val="lt1"/>
+          </a:fontRef>
+        </p:style>
+        <p:txBody>
+          <a:bodyPr rtlCol="0" anchor="ctr"/>
+          <a:lstStyle/>
+          <a:p>
+            <a:pPr algn="ctr"/>
+            <a:endParaRPr lang="zh-TW" altLang="en-US">
+              <a:solidFill>
+                <a:srgbClr val="C3C33D"/>
+              </a:solidFill>
+            </a:endParaRPr>
+          </a:p>
+        </p:txBody>
+      </p:sp>
       <p:grpSp>
         <p:nvGrpSpPr>
           <p:cNvPr id="21" name="群組 20"/>
@@ -11716,7 +14095,7 @@
         </p:nvGrpSpPr>
         <p:grpSpPr>
           <a:xfrm>
-            <a:off x="4718456" y="6077966"/>
+            <a:off x="5150122" y="5896934"/>
             <a:ext cx="10710658" cy="8882309"/>
             <a:chOff x="7164388" y="13068229"/>
             <a:chExt cx="3772772" cy="2804388"/>
@@ -19560,6 +21939,158 @@
           </p:txBody>
         </p:sp>
       </p:grpSp>
+      <p:sp>
+        <p:nvSpPr>
+          <p:cNvPr id="30" name="菱形 29"/>
+          <p:cNvSpPr/>
+          <p:nvPr/>
+        </p:nvSpPr>
+        <p:spPr>
+          <a:xfrm rot="18866592">
+            <a:off x="10677763" y="14809121"/>
+            <a:ext cx="3130464" cy="2117196"/>
+          </a:xfrm>
+          <a:prstGeom prst="diamond">
+            <a:avLst/>
+          </a:prstGeom>
+          <a:solidFill>
+            <a:srgbClr val="C3C33D"/>
+          </a:solidFill>
+          <a:ln>
+            <a:noFill/>
+          </a:ln>
+        </p:spPr>
+        <p:style>
+          <a:lnRef idx="2">
+            <a:schemeClr val="accent1">
+              <a:shade val="50000"/>
+            </a:schemeClr>
+          </a:lnRef>
+          <a:fillRef idx="1">
+            <a:schemeClr val="accent1"/>
+          </a:fillRef>
+          <a:effectRef idx="0">
+            <a:schemeClr val="accent1"/>
+          </a:effectRef>
+          <a:fontRef idx="minor">
+            <a:schemeClr val="lt1"/>
+          </a:fontRef>
+        </p:style>
+        <p:txBody>
+          <a:bodyPr rtlCol="0" anchor="ctr"/>
+          <a:lstStyle/>
+          <a:p>
+            <a:pPr algn="ctr"/>
+            <a:endParaRPr lang="zh-TW" altLang="en-US" dirty="0">
+              <a:solidFill>
+                <a:srgbClr val="C3C33D"/>
+              </a:solidFill>
+            </a:endParaRPr>
+          </a:p>
+        </p:txBody>
+      </p:sp>
+      <p:sp>
+        <p:nvSpPr>
+          <p:cNvPr id="6" name="橢圓 5"/>
+          <p:cNvSpPr/>
+          <p:nvPr/>
+        </p:nvSpPr>
+        <p:spPr>
+          <a:xfrm>
+            <a:off x="8356954" y="14547889"/>
+            <a:ext cx="1886888" cy="2014823"/>
+          </a:xfrm>
+          <a:prstGeom prst="ellipse">
+            <a:avLst/>
+          </a:prstGeom>
+          <a:solidFill>
+            <a:srgbClr val="C3C33D"/>
+          </a:solidFill>
+          <a:ln>
+            <a:noFill/>
+          </a:ln>
+        </p:spPr>
+        <p:style>
+          <a:lnRef idx="2">
+            <a:schemeClr val="accent1">
+              <a:shade val="50000"/>
+            </a:schemeClr>
+          </a:lnRef>
+          <a:fillRef idx="1">
+            <a:schemeClr val="accent1"/>
+          </a:fillRef>
+          <a:effectRef idx="0">
+            <a:schemeClr val="accent1"/>
+          </a:effectRef>
+          <a:fontRef idx="minor">
+            <a:schemeClr val="lt1"/>
+          </a:fontRef>
+        </p:style>
+        <p:txBody>
+          <a:bodyPr rtlCol="0" anchor="ctr"/>
+          <a:lstStyle/>
+          <a:p>
+            <a:pPr algn="ctr"/>
+            <a:endParaRPr lang="zh-TW" altLang="en-US">
+              <a:solidFill>
+                <a:srgbClr val="C3C33D"/>
+              </a:solidFill>
+            </a:endParaRPr>
+          </a:p>
+        </p:txBody>
+      </p:sp>
+      <p:sp>
+        <p:nvSpPr>
+          <p:cNvPr id="2" name="矩形 1"/>
+          <p:cNvSpPr/>
+          <p:nvPr/>
+        </p:nvSpPr>
+        <p:spPr>
+          <a:xfrm>
+            <a:off x="11693803" y="15494701"/>
+            <a:ext cx="1098379" cy="646331"/>
+          </a:xfrm>
+          <a:prstGeom prst="rect">
+            <a:avLst/>
+          </a:prstGeom>
+        </p:spPr>
+        <p:txBody>
+          <a:bodyPr wrap="none">
+            <a:spAutoFit/>
+          </a:bodyPr>
+          <a:lstStyle/>
+          <a:p>
+            <a:pPr algn="ctr"/>
+            <a:r>
+              <a:rPr lang="zh-TW" altLang="en-US" sz="3600" b="1" dirty="0" smtClean="0">
+                <a:solidFill>
+                  <a:srgbClr val="283C3C"/>
+                </a:solidFill>
+                <a:latin typeface="Noto Sans CJK TC Light" panose="020B0300000000000000" pitchFamily="34" charset="-120"/>
+                <a:ea typeface="Noto Sans CJK TC Light" panose="020B0300000000000000" pitchFamily="34" charset="-120"/>
+              </a:rPr>
+              <a:t>廠</a:t>
+            </a:r>
+            <a:r>
+              <a:rPr lang="en-US" altLang="zh-TW" sz="3600" b="1" dirty="0" err="1" smtClean="0">
+                <a:solidFill>
+                  <a:srgbClr val="283C3C"/>
+                </a:solidFill>
+                <a:latin typeface="Noto Sans CJK TC Light" panose="020B0300000000000000" pitchFamily="34" charset="-120"/>
+                <a:ea typeface="Noto Sans CJK TC Light" panose="020B0300000000000000" pitchFamily="34" charset="-120"/>
+              </a:rPr>
+              <a:t>er</a:t>
+            </a:r>
+            <a:endParaRPr lang="zh-TW" altLang="en-US" sz="3600" b="1" dirty="0">
+              <a:solidFill>
+                <a:srgbClr val="283C3C"/>
+              </a:solidFill>
+              <a:latin typeface="Noto Sans CJK TC Light" panose="020B0300000000000000" pitchFamily="34" charset="-120"/>
+              <a:ea typeface="Noto Sans CJK TC Light" panose="020B0300000000000000" pitchFamily="34" charset="-120"/>
+            </a:endParaRPr>
+          </a:p>
+        </p:txBody>
+      </p:sp>
     </p:spTree>
     <p:extLst>
       <p:ext uri="{BB962C8B-B14F-4D97-AF65-F5344CB8AC3E}">
@@ -19588,7 +22119,7 @@
 </p:sld>
 </file>
 
-<file path=ppt/slides/slide6.xml><?xml version="1.0" encoding="utf-8"?>
+<file path=ppt/slides/slide7.xml><?xml version="1.0" encoding="utf-8"?>
 <p:sld xmlns:a="http://schemas.openxmlformats.org/drawingml/2006/main" xmlns:r="http://schemas.openxmlformats.org/officeDocument/2006/relationships" xmlns:p="http://schemas.openxmlformats.org/presentationml/2006/main" show="0">
   <p:cSld>
     <p:spTree>

</xml_diff>